<commit_message>
removing animations from the slides I just commited
</commit_message>
<xml_diff>
--- a/presentations/2017-04-brandeis-meeting.pptx
+++ b/presentations/2017-04-brandeis-meeting.pptx
@@ -1275,15 +1275,7 @@
             </a:r>
             <a:r>
               <a:rPr lang="en-US" baseline="0" dirty="0" smtClean="0"/>
-              <a:t> team who is heading the explanations task is working with us develop and run human studies. He is also interested in applying the work </a:t>
-            </a:r>
-            <a:r>
-              <a:rPr lang="en-US" baseline="0" smtClean="0"/>
-              <a:t>to other opaque </a:t>
-            </a:r>
-            <a:r>
-              <a:rPr lang="en-US" baseline="0" dirty="0" smtClean="0"/>
-              <a:t>systems in need of explanation from other Brandeis teams especially if they can share user data.  </a:t>
+              <a:t> team who is heading the explanations task is working with us develop and run human studies. He is also interested in applying the work to other opaque systems in need of explanation from other Brandeis teams especially if they can share user data.  </a:t>
             </a:r>
             <a:endParaRPr lang="en-US" dirty="0"/>
           </a:p>
@@ -10350,442 +10342,7 @@
   <p:timing>
     <p:tnLst>
       <p:par>
-        <p:cTn id="1" dur="indefinite" restart="never" nodeType="tmRoot">
-          <p:childTnLst>
-            <p:seq concurrent="1" nextAc="seek">
-              <p:cTn id="2" dur="indefinite" nodeType="mainSeq">
-                <p:childTnLst>
-                  <p:par>
-                    <p:cTn id="3" fill="hold">
-                      <p:stCondLst>
-                        <p:cond delay="indefinite"/>
-                      </p:stCondLst>
-                      <p:childTnLst>
-                        <p:par>
-                          <p:cTn id="4" fill="hold">
-                            <p:stCondLst>
-                              <p:cond delay="0"/>
-                            </p:stCondLst>
-                            <p:childTnLst>
-                              <p:par>
-                                <p:cTn id="5" presetID="2" presetClass="entr" presetSubtype="4" fill="hold" nodeType="clickEffect">
-                                  <p:stCondLst>
-                                    <p:cond delay="0"/>
-                                  </p:stCondLst>
-                                  <p:childTnLst>
-                                    <p:set>
-                                      <p:cBhvr>
-                                        <p:cTn id="6" dur="1" fill="hold">
-                                          <p:stCondLst>
-                                            <p:cond delay="0"/>
-                                          </p:stCondLst>
-                                        </p:cTn>
-                                        <p:tgtEl>
-                                          <p:spTgt spid="5">
-                                            <p:txEl>
-                                              <p:pRg st="1" end="1"/>
-                                            </p:txEl>
-                                          </p:spTgt>
-                                        </p:tgtEl>
-                                        <p:attrNameLst>
-                                          <p:attrName>style.visibility</p:attrName>
-                                        </p:attrNameLst>
-                                      </p:cBhvr>
-                                      <p:to>
-                                        <p:strVal val="visible"/>
-                                      </p:to>
-                                    </p:set>
-                                    <p:anim calcmode="lin" valueType="num">
-                                      <p:cBhvr additive="base">
-                                        <p:cTn id="7" dur="500" fill="hold"/>
-                                        <p:tgtEl>
-                                          <p:spTgt spid="5">
-                                            <p:txEl>
-                                              <p:pRg st="1" end="1"/>
-                                            </p:txEl>
-                                          </p:spTgt>
-                                        </p:tgtEl>
-                                        <p:attrNameLst>
-                                          <p:attrName>ppt_x</p:attrName>
-                                        </p:attrNameLst>
-                                      </p:cBhvr>
-                                      <p:tavLst>
-                                        <p:tav tm="0">
-                                          <p:val>
-                                            <p:strVal val="#ppt_x"/>
-                                          </p:val>
-                                        </p:tav>
-                                        <p:tav tm="100000">
-                                          <p:val>
-                                            <p:strVal val="#ppt_x"/>
-                                          </p:val>
-                                        </p:tav>
-                                      </p:tavLst>
-                                    </p:anim>
-                                    <p:anim calcmode="lin" valueType="num">
-                                      <p:cBhvr additive="base">
-                                        <p:cTn id="8" dur="500" fill="hold"/>
-                                        <p:tgtEl>
-                                          <p:spTgt spid="5">
-                                            <p:txEl>
-                                              <p:pRg st="1" end="1"/>
-                                            </p:txEl>
-                                          </p:spTgt>
-                                        </p:tgtEl>
-                                        <p:attrNameLst>
-                                          <p:attrName>ppt_y</p:attrName>
-                                        </p:attrNameLst>
-                                      </p:cBhvr>
-                                      <p:tavLst>
-                                        <p:tav tm="0">
-                                          <p:val>
-                                            <p:strVal val="1+#ppt_h/2"/>
-                                          </p:val>
-                                        </p:tav>
-                                        <p:tav tm="100000">
-                                          <p:val>
-                                            <p:strVal val="#ppt_y"/>
-                                          </p:val>
-                                        </p:tav>
-                                      </p:tavLst>
-                                    </p:anim>
-                                  </p:childTnLst>
-                                </p:cTn>
-                              </p:par>
-                            </p:childTnLst>
-                          </p:cTn>
-                        </p:par>
-                      </p:childTnLst>
-                    </p:cTn>
-                  </p:par>
-                  <p:par>
-                    <p:cTn id="9" fill="hold">
-                      <p:stCondLst>
-                        <p:cond delay="indefinite"/>
-                      </p:stCondLst>
-                      <p:childTnLst>
-                        <p:par>
-                          <p:cTn id="10" fill="hold">
-                            <p:stCondLst>
-                              <p:cond delay="0"/>
-                            </p:stCondLst>
-                            <p:childTnLst>
-                              <p:par>
-                                <p:cTn id="11" presetID="2" presetClass="entr" presetSubtype="4" fill="hold" nodeType="clickEffect">
-                                  <p:stCondLst>
-                                    <p:cond delay="0"/>
-                                  </p:stCondLst>
-                                  <p:childTnLst>
-                                    <p:set>
-                                      <p:cBhvr>
-                                        <p:cTn id="12" dur="1" fill="hold">
-                                          <p:stCondLst>
-                                            <p:cond delay="0"/>
-                                          </p:stCondLst>
-                                        </p:cTn>
-                                        <p:tgtEl>
-                                          <p:spTgt spid="5">
-                                            <p:txEl>
-                                              <p:pRg st="2" end="2"/>
-                                            </p:txEl>
-                                          </p:spTgt>
-                                        </p:tgtEl>
-                                        <p:attrNameLst>
-                                          <p:attrName>style.visibility</p:attrName>
-                                        </p:attrNameLst>
-                                      </p:cBhvr>
-                                      <p:to>
-                                        <p:strVal val="visible"/>
-                                      </p:to>
-                                    </p:set>
-                                    <p:anim calcmode="lin" valueType="num">
-                                      <p:cBhvr additive="base">
-                                        <p:cTn id="13" dur="500" fill="hold"/>
-                                        <p:tgtEl>
-                                          <p:spTgt spid="5">
-                                            <p:txEl>
-                                              <p:pRg st="2" end="2"/>
-                                            </p:txEl>
-                                          </p:spTgt>
-                                        </p:tgtEl>
-                                        <p:attrNameLst>
-                                          <p:attrName>ppt_x</p:attrName>
-                                        </p:attrNameLst>
-                                      </p:cBhvr>
-                                      <p:tavLst>
-                                        <p:tav tm="0">
-                                          <p:val>
-                                            <p:strVal val="#ppt_x"/>
-                                          </p:val>
-                                        </p:tav>
-                                        <p:tav tm="100000">
-                                          <p:val>
-                                            <p:strVal val="#ppt_x"/>
-                                          </p:val>
-                                        </p:tav>
-                                      </p:tavLst>
-                                    </p:anim>
-                                    <p:anim calcmode="lin" valueType="num">
-                                      <p:cBhvr additive="base">
-                                        <p:cTn id="14" dur="500" fill="hold"/>
-                                        <p:tgtEl>
-                                          <p:spTgt spid="5">
-                                            <p:txEl>
-                                              <p:pRg st="2" end="2"/>
-                                            </p:txEl>
-                                          </p:spTgt>
-                                        </p:tgtEl>
-                                        <p:attrNameLst>
-                                          <p:attrName>ppt_y</p:attrName>
-                                        </p:attrNameLst>
-                                      </p:cBhvr>
-                                      <p:tavLst>
-                                        <p:tav tm="0">
-                                          <p:val>
-                                            <p:strVal val="1+#ppt_h/2"/>
-                                          </p:val>
-                                        </p:tav>
-                                        <p:tav tm="100000">
-                                          <p:val>
-                                            <p:strVal val="#ppt_y"/>
-                                          </p:val>
-                                        </p:tav>
-                                      </p:tavLst>
-                                    </p:anim>
-                                  </p:childTnLst>
-                                </p:cTn>
-                              </p:par>
-                            </p:childTnLst>
-                          </p:cTn>
-                        </p:par>
-                      </p:childTnLst>
-                    </p:cTn>
-                  </p:par>
-                  <p:par>
-                    <p:cTn id="15" fill="hold">
-                      <p:stCondLst>
-                        <p:cond delay="indefinite"/>
-                      </p:stCondLst>
-                      <p:childTnLst>
-                        <p:par>
-                          <p:cTn id="16" fill="hold">
-                            <p:stCondLst>
-                              <p:cond delay="0"/>
-                            </p:stCondLst>
-                            <p:childTnLst>
-                              <p:par>
-                                <p:cTn id="17" presetID="2" presetClass="entr" presetSubtype="4" fill="hold" nodeType="clickEffect">
-                                  <p:stCondLst>
-                                    <p:cond delay="0"/>
-                                  </p:stCondLst>
-                                  <p:childTnLst>
-                                    <p:set>
-                                      <p:cBhvr>
-                                        <p:cTn id="18" dur="1" fill="hold">
-                                          <p:stCondLst>
-                                            <p:cond delay="0"/>
-                                          </p:stCondLst>
-                                        </p:cTn>
-                                        <p:tgtEl>
-                                          <p:spTgt spid="5">
-                                            <p:txEl>
-                                              <p:pRg st="3" end="3"/>
-                                            </p:txEl>
-                                          </p:spTgt>
-                                        </p:tgtEl>
-                                        <p:attrNameLst>
-                                          <p:attrName>style.visibility</p:attrName>
-                                        </p:attrNameLst>
-                                      </p:cBhvr>
-                                      <p:to>
-                                        <p:strVal val="visible"/>
-                                      </p:to>
-                                    </p:set>
-                                    <p:anim calcmode="lin" valueType="num">
-                                      <p:cBhvr additive="base">
-                                        <p:cTn id="19" dur="500" fill="hold"/>
-                                        <p:tgtEl>
-                                          <p:spTgt spid="5">
-                                            <p:txEl>
-                                              <p:pRg st="3" end="3"/>
-                                            </p:txEl>
-                                          </p:spTgt>
-                                        </p:tgtEl>
-                                        <p:attrNameLst>
-                                          <p:attrName>ppt_x</p:attrName>
-                                        </p:attrNameLst>
-                                      </p:cBhvr>
-                                      <p:tavLst>
-                                        <p:tav tm="0">
-                                          <p:val>
-                                            <p:strVal val="#ppt_x"/>
-                                          </p:val>
-                                        </p:tav>
-                                        <p:tav tm="100000">
-                                          <p:val>
-                                            <p:strVal val="#ppt_x"/>
-                                          </p:val>
-                                        </p:tav>
-                                      </p:tavLst>
-                                    </p:anim>
-                                    <p:anim calcmode="lin" valueType="num">
-                                      <p:cBhvr additive="base">
-                                        <p:cTn id="20" dur="500" fill="hold"/>
-                                        <p:tgtEl>
-                                          <p:spTgt spid="5">
-                                            <p:txEl>
-                                              <p:pRg st="3" end="3"/>
-                                            </p:txEl>
-                                          </p:spTgt>
-                                        </p:tgtEl>
-                                        <p:attrNameLst>
-                                          <p:attrName>ppt_y</p:attrName>
-                                        </p:attrNameLst>
-                                      </p:cBhvr>
-                                      <p:tavLst>
-                                        <p:tav tm="0">
-                                          <p:val>
-                                            <p:strVal val="1+#ppt_h/2"/>
-                                          </p:val>
-                                        </p:tav>
-                                        <p:tav tm="100000">
-                                          <p:val>
-                                            <p:strVal val="#ppt_y"/>
-                                          </p:val>
-                                        </p:tav>
-                                      </p:tavLst>
-                                    </p:anim>
-                                  </p:childTnLst>
-                                </p:cTn>
-                              </p:par>
-                            </p:childTnLst>
-                          </p:cTn>
-                        </p:par>
-                      </p:childTnLst>
-                    </p:cTn>
-                  </p:par>
-                  <p:par>
-                    <p:cTn id="21" fill="hold">
-                      <p:stCondLst>
-                        <p:cond delay="indefinite"/>
-                      </p:stCondLst>
-                      <p:childTnLst>
-                        <p:par>
-                          <p:cTn id="22" fill="hold">
-                            <p:stCondLst>
-                              <p:cond delay="0"/>
-                            </p:stCondLst>
-                            <p:childTnLst>
-                              <p:par>
-                                <p:cTn id="23" presetID="2" presetClass="entr" presetSubtype="4" fill="hold" nodeType="clickEffect">
-                                  <p:stCondLst>
-                                    <p:cond delay="0"/>
-                                  </p:stCondLst>
-                                  <p:childTnLst>
-                                    <p:set>
-                                      <p:cBhvr>
-                                        <p:cTn id="24" dur="1" fill="hold">
-                                          <p:stCondLst>
-                                            <p:cond delay="0"/>
-                                          </p:stCondLst>
-                                        </p:cTn>
-                                        <p:tgtEl>
-                                          <p:spTgt spid="5">
-                                            <p:txEl>
-                                              <p:pRg st="4" end="4"/>
-                                            </p:txEl>
-                                          </p:spTgt>
-                                        </p:tgtEl>
-                                        <p:attrNameLst>
-                                          <p:attrName>style.visibility</p:attrName>
-                                        </p:attrNameLst>
-                                      </p:cBhvr>
-                                      <p:to>
-                                        <p:strVal val="visible"/>
-                                      </p:to>
-                                    </p:set>
-                                    <p:anim calcmode="lin" valueType="num">
-                                      <p:cBhvr additive="base">
-                                        <p:cTn id="25" dur="500" fill="hold"/>
-                                        <p:tgtEl>
-                                          <p:spTgt spid="5">
-                                            <p:txEl>
-                                              <p:pRg st="4" end="4"/>
-                                            </p:txEl>
-                                          </p:spTgt>
-                                        </p:tgtEl>
-                                        <p:attrNameLst>
-                                          <p:attrName>ppt_x</p:attrName>
-                                        </p:attrNameLst>
-                                      </p:cBhvr>
-                                      <p:tavLst>
-                                        <p:tav tm="0">
-                                          <p:val>
-                                            <p:strVal val="#ppt_x"/>
-                                          </p:val>
-                                        </p:tav>
-                                        <p:tav tm="100000">
-                                          <p:val>
-                                            <p:strVal val="#ppt_x"/>
-                                          </p:val>
-                                        </p:tav>
-                                      </p:tavLst>
-                                    </p:anim>
-                                    <p:anim calcmode="lin" valueType="num">
-                                      <p:cBhvr additive="base">
-                                        <p:cTn id="26" dur="500" fill="hold"/>
-                                        <p:tgtEl>
-                                          <p:spTgt spid="5">
-                                            <p:txEl>
-                                              <p:pRg st="4" end="4"/>
-                                            </p:txEl>
-                                          </p:spTgt>
-                                        </p:tgtEl>
-                                        <p:attrNameLst>
-                                          <p:attrName>ppt_y</p:attrName>
-                                        </p:attrNameLst>
-                                      </p:cBhvr>
-                                      <p:tavLst>
-                                        <p:tav tm="0">
-                                          <p:val>
-                                            <p:strVal val="1+#ppt_h/2"/>
-                                          </p:val>
-                                        </p:tav>
-                                        <p:tav tm="100000">
-                                          <p:val>
-                                            <p:strVal val="#ppt_y"/>
-                                          </p:val>
-                                        </p:tav>
-                                      </p:tavLst>
-                                    </p:anim>
-                                  </p:childTnLst>
-                                </p:cTn>
-                              </p:par>
-                            </p:childTnLst>
-                          </p:cTn>
-                        </p:par>
-                      </p:childTnLst>
-                    </p:cTn>
-                  </p:par>
-                </p:childTnLst>
-              </p:cTn>
-              <p:prevCondLst>
-                <p:cond evt="onPrev" delay="0">
-                  <p:tgtEl>
-                    <p:sldTgt/>
-                  </p:tgtEl>
-                </p:cond>
-              </p:prevCondLst>
-              <p:nextCondLst>
-                <p:cond evt="onNext" delay="0">
-                  <p:tgtEl>
-                    <p:sldTgt/>
-                  </p:tgtEl>
-                </p:cond>
-              </p:nextCondLst>
-            </p:seq>
-          </p:childTnLst>
-        </p:cTn>
+        <p:cTn id="1" dur="indefinite" restart="never" nodeType="tmRoot"/>
       </p:par>
     </p:tnLst>
   </p:timing>
@@ -11665,648 +11222,7 @@
   <p:timing>
     <p:tnLst>
       <p:par>
-        <p:cTn id="1" dur="indefinite" restart="never" nodeType="tmRoot">
-          <p:childTnLst>
-            <p:seq concurrent="1" nextAc="seek">
-              <p:cTn id="2" dur="indefinite" nodeType="mainSeq">
-                <p:childTnLst>
-                  <p:par>
-                    <p:cTn id="3" fill="hold">
-                      <p:stCondLst>
-                        <p:cond delay="indefinite"/>
-                      </p:stCondLst>
-                      <p:childTnLst>
-                        <p:par>
-                          <p:cTn id="4" fill="hold">
-                            <p:stCondLst>
-                              <p:cond delay="0"/>
-                            </p:stCondLst>
-                            <p:childTnLst>
-                              <p:par>
-                                <p:cTn id="5" presetID="2" presetClass="entr" presetSubtype="4" fill="hold" nodeType="clickEffect">
-                                  <p:stCondLst>
-                                    <p:cond delay="0"/>
-                                  </p:stCondLst>
-                                  <p:childTnLst>
-                                    <p:set>
-                                      <p:cBhvr>
-                                        <p:cTn id="6" dur="1" fill="hold">
-                                          <p:stCondLst>
-                                            <p:cond delay="0"/>
-                                          </p:stCondLst>
-                                        </p:cTn>
-                                        <p:tgtEl>
-                                          <p:spTgt spid="5">
-                                            <p:txEl>
-                                              <p:pRg st="0" end="0"/>
-                                            </p:txEl>
-                                          </p:spTgt>
-                                        </p:tgtEl>
-                                        <p:attrNameLst>
-                                          <p:attrName>style.visibility</p:attrName>
-                                        </p:attrNameLst>
-                                      </p:cBhvr>
-                                      <p:to>
-                                        <p:strVal val="visible"/>
-                                      </p:to>
-                                    </p:set>
-                                    <p:anim calcmode="lin" valueType="num">
-                                      <p:cBhvr additive="base">
-                                        <p:cTn id="7" dur="500" fill="hold"/>
-                                        <p:tgtEl>
-                                          <p:spTgt spid="5">
-                                            <p:txEl>
-                                              <p:pRg st="0" end="0"/>
-                                            </p:txEl>
-                                          </p:spTgt>
-                                        </p:tgtEl>
-                                        <p:attrNameLst>
-                                          <p:attrName>ppt_x</p:attrName>
-                                        </p:attrNameLst>
-                                      </p:cBhvr>
-                                      <p:tavLst>
-                                        <p:tav tm="0">
-                                          <p:val>
-                                            <p:strVal val="#ppt_x"/>
-                                          </p:val>
-                                        </p:tav>
-                                        <p:tav tm="100000">
-                                          <p:val>
-                                            <p:strVal val="#ppt_x"/>
-                                          </p:val>
-                                        </p:tav>
-                                      </p:tavLst>
-                                    </p:anim>
-                                    <p:anim calcmode="lin" valueType="num">
-                                      <p:cBhvr additive="base">
-                                        <p:cTn id="8" dur="500" fill="hold"/>
-                                        <p:tgtEl>
-                                          <p:spTgt spid="5">
-                                            <p:txEl>
-                                              <p:pRg st="0" end="0"/>
-                                            </p:txEl>
-                                          </p:spTgt>
-                                        </p:tgtEl>
-                                        <p:attrNameLst>
-                                          <p:attrName>ppt_y</p:attrName>
-                                        </p:attrNameLst>
-                                      </p:cBhvr>
-                                      <p:tavLst>
-                                        <p:tav tm="0">
-                                          <p:val>
-                                            <p:strVal val="1+#ppt_h/2"/>
-                                          </p:val>
-                                        </p:tav>
-                                        <p:tav tm="100000">
-                                          <p:val>
-                                            <p:strVal val="#ppt_y"/>
-                                          </p:val>
-                                        </p:tav>
-                                      </p:tavLst>
-                                    </p:anim>
-                                  </p:childTnLst>
-                                </p:cTn>
-                              </p:par>
-                            </p:childTnLst>
-                          </p:cTn>
-                        </p:par>
-                      </p:childTnLst>
-                    </p:cTn>
-                  </p:par>
-                  <p:par>
-                    <p:cTn id="9" fill="hold">
-                      <p:stCondLst>
-                        <p:cond delay="indefinite"/>
-                      </p:stCondLst>
-                      <p:childTnLst>
-                        <p:par>
-                          <p:cTn id="10" fill="hold">
-                            <p:stCondLst>
-                              <p:cond delay="0"/>
-                            </p:stCondLst>
-                            <p:childTnLst>
-                              <p:par>
-                                <p:cTn id="11" presetID="2" presetClass="entr" presetSubtype="4" fill="hold" nodeType="clickEffect">
-                                  <p:stCondLst>
-                                    <p:cond delay="0"/>
-                                  </p:stCondLst>
-                                  <p:childTnLst>
-                                    <p:set>
-                                      <p:cBhvr>
-                                        <p:cTn id="12" dur="1" fill="hold">
-                                          <p:stCondLst>
-                                            <p:cond delay="0"/>
-                                          </p:stCondLst>
-                                        </p:cTn>
-                                        <p:tgtEl>
-                                          <p:spTgt spid="5">
-                                            <p:txEl>
-                                              <p:pRg st="1" end="1"/>
-                                            </p:txEl>
-                                          </p:spTgt>
-                                        </p:tgtEl>
-                                        <p:attrNameLst>
-                                          <p:attrName>style.visibility</p:attrName>
-                                        </p:attrNameLst>
-                                      </p:cBhvr>
-                                      <p:to>
-                                        <p:strVal val="visible"/>
-                                      </p:to>
-                                    </p:set>
-                                    <p:anim calcmode="lin" valueType="num">
-                                      <p:cBhvr additive="base">
-                                        <p:cTn id="13" dur="500" fill="hold"/>
-                                        <p:tgtEl>
-                                          <p:spTgt spid="5">
-                                            <p:txEl>
-                                              <p:pRg st="1" end="1"/>
-                                            </p:txEl>
-                                          </p:spTgt>
-                                        </p:tgtEl>
-                                        <p:attrNameLst>
-                                          <p:attrName>ppt_x</p:attrName>
-                                        </p:attrNameLst>
-                                      </p:cBhvr>
-                                      <p:tavLst>
-                                        <p:tav tm="0">
-                                          <p:val>
-                                            <p:strVal val="#ppt_x"/>
-                                          </p:val>
-                                        </p:tav>
-                                        <p:tav tm="100000">
-                                          <p:val>
-                                            <p:strVal val="#ppt_x"/>
-                                          </p:val>
-                                        </p:tav>
-                                      </p:tavLst>
-                                    </p:anim>
-                                    <p:anim calcmode="lin" valueType="num">
-                                      <p:cBhvr additive="base">
-                                        <p:cTn id="14" dur="500" fill="hold"/>
-                                        <p:tgtEl>
-                                          <p:spTgt spid="5">
-                                            <p:txEl>
-                                              <p:pRg st="1" end="1"/>
-                                            </p:txEl>
-                                          </p:spTgt>
-                                        </p:tgtEl>
-                                        <p:attrNameLst>
-                                          <p:attrName>ppt_y</p:attrName>
-                                        </p:attrNameLst>
-                                      </p:cBhvr>
-                                      <p:tavLst>
-                                        <p:tav tm="0">
-                                          <p:val>
-                                            <p:strVal val="1+#ppt_h/2"/>
-                                          </p:val>
-                                        </p:tav>
-                                        <p:tav tm="100000">
-                                          <p:val>
-                                            <p:strVal val="#ppt_y"/>
-                                          </p:val>
-                                        </p:tav>
-                                      </p:tavLst>
-                                    </p:anim>
-                                  </p:childTnLst>
-                                </p:cTn>
-                              </p:par>
-                            </p:childTnLst>
-                          </p:cTn>
-                        </p:par>
-                      </p:childTnLst>
-                    </p:cTn>
-                  </p:par>
-                  <p:par>
-                    <p:cTn id="15" fill="hold">
-                      <p:stCondLst>
-                        <p:cond delay="indefinite"/>
-                      </p:stCondLst>
-                      <p:childTnLst>
-                        <p:par>
-                          <p:cTn id="16" fill="hold">
-                            <p:stCondLst>
-                              <p:cond delay="0"/>
-                            </p:stCondLst>
-                            <p:childTnLst>
-                              <p:par>
-                                <p:cTn id="17" presetID="2" presetClass="entr" presetSubtype="4" fill="hold" nodeType="clickEffect">
-                                  <p:stCondLst>
-                                    <p:cond delay="0"/>
-                                  </p:stCondLst>
-                                  <p:childTnLst>
-                                    <p:set>
-                                      <p:cBhvr>
-                                        <p:cTn id="18" dur="1" fill="hold">
-                                          <p:stCondLst>
-                                            <p:cond delay="0"/>
-                                          </p:stCondLst>
-                                        </p:cTn>
-                                        <p:tgtEl>
-                                          <p:spTgt spid="5">
-                                            <p:txEl>
-                                              <p:pRg st="2" end="2"/>
-                                            </p:txEl>
-                                          </p:spTgt>
-                                        </p:tgtEl>
-                                        <p:attrNameLst>
-                                          <p:attrName>style.visibility</p:attrName>
-                                        </p:attrNameLst>
-                                      </p:cBhvr>
-                                      <p:to>
-                                        <p:strVal val="visible"/>
-                                      </p:to>
-                                    </p:set>
-                                    <p:anim calcmode="lin" valueType="num">
-                                      <p:cBhvr additive="base">
-                                        <p:cTn id="19" dur="500" fill="hold"/>
-                                        <p:tgtEl>
-                                          <p:spTgt spid="5">
-                                            <p:txEl>
-                                              <p:pRg st="2" end="2"/>
-                                            </p:txEl>
-                                          </p:spTgt>
-                                        </p:tgtEl>
-                                        <p:attrNameLst>
-                                          <p:attrName>ppt_x</p:attrName>
-                                        </p:attrNameLst>
-                                      </p:cBhvr>
-                                      <p:tavLst>
-                                        <p:tav tm="0">
-                                          <p:val>
-                                            <p:strVal val="#ppt_x"/>
-                                          </p:val>
-                                        </p:tav>
-                                        <p:tav tm="100000">
-                                          <p:val>
-                                            <p:strVal val="#ppt_x"/>
-                                          </p:val>
-                                        </p:tav>
-                                      </p:tavLst>
-                                    </p:anim>
-                                    <p:anim calcmode="lin" valueType="num">
-                                      <p:cBhvr additive="base">
-                                        <p:cTn id="20" dur="500" fill="hold"/>
-                                        <p:tgtEl>
-                                          <p:spTgt spid="5">
-                                            <p:txEl>
-                                              <p:pRg st="2" end="2"/>
-                                            </p:txEl>
-                                          </p:spTgt>
-                                        </p:tgtEl>
-                                        <p:attrNameLst>
-                                          <p:attrName>ppt_y</p:attrName>
-                                        </p:attrNameLst>
-                                      </p:cBhvr>
-                                      <p:tavLst>
-                                        <p:tav tm="0">
-                                          <p:val>
-                                            <p:strVal val="1+#ppt_h/2"/>
-                                          </p:val>
-                                        </p:tav>
-                                        <p:tav tm="100000">
-                                          <p:val>
-                                            <p:strVal val="#ppt_y"/>
-                                          </p:val>
-                                        </p:tav>
-                                      </p:tavLst>
-                                    </p:anim>
-                                  </p:childTnLst>
-                                </p:cTn>
-                              </p:par>
-                            </p:childTnLst>
-                          </p:cTn>
-                        </p:par>
-                      </p:childTnLst>
-                    </p:cTn>
-                  </p:par>
-                  <p:par>
-                    <p:cTn id="21" fill="hold">
-                      <p:stCondLst>
-                        <p:cond delay="indefinite"/>
-                      </p:stCondLst>
-                      <p:childTnLst>
-                        <p:par>
-                          <p:cTn id="22" fill="hold">
-                            <p:stCondLst>
-                              <p:cond delay="0"/>
-                            </p:stCondLst>
-                            <p:childTnLst>
-                              <p:par>
-                                <p:cTn id="23" presetID="2" presetClass="entr" presetSubtype="4" fill="hold" nodeType="clickEffect">
-                                  <p:stCondLst>
-                                    <p:cond delay="0"/>
-                                  </p:stCondLst>
-                                  <p:childTnLst>
-                                    <p:set>
-                                      <p:cBhvr>
-                                        <p:cTn id="24" dur="1" fill="hold">
-                                          <p:stCondLst>
-                                            <p:cond delay="0"/>
-                                          </p:stCondLst>
-                                        </p:cTn>
-                                        <p:tgtEl>
-                                          <p:spTgt spid="5">
-                                            <p:txEl>
-                                              <p:pRg st="3" end="3"/>
-                                            </p:txEl>
-                                          </p:spTgt>
-                                        </p:tgtEl>
-                                        <p:attrNameLst>
-                                          <p:attrName>style.visibility</p:attrName>
-                                        </p:attrNameLst>
-                                      </p:cBhvr>
-                                      <p:to>
-                                        <p:strVal val="visible"/>
-                                      </p:to>
-                                    </p:set>
-                                    <p:anim calcmode="lin" valueType="num">
-                                      <p:cBhvr additive="base">
-                                        <p:cTn id="25" dur="500" fill="hold"/>
-                                        <p:tgtEl>
-                                          <p:spTgt spid="5">
-                                            <p:txEl>
-                                              <p:pRg st="3" end="3"/>
-                                            </p:txEl>
-                                          </p:spTgt>
-                                        </p:tgtEl>
-                                        <p:attrNameLst>
-                                          <p:attrName>ppt_x</p:attrName>
-                                        </p:attrNameLst>
-                                      </p:cBhvr>
-                                      <p:tavLst>
-                                        <p:tav tm="0">
-                                          <p:val>
-                                            <p:strVal val="#ppt_x"/>
-                                          </p:val>
-                                        </p:tav>
-                                        <p:tav tm="100000">
-                                          <p:val>
-                                            <p:strVal val="#ppt_x"/>
-                                          </p:val>
-                                        </p:tav>
-                                      </p:tavLst>
-                                    </p:anim>
-                                    <p:anim calcmode="lin" valueType="num">
-                                      <p:cBhvr additive="base">
-                                        <p:cTn id="26" dur="500" fill="hold"/>
-                                        <p:tgtEl>
-                                          <p:spTgt spid="5">
-                                            <p:txEl>
-                                              <p:pRg st="3" end="3"/>
-                                            </p:txEl>
-                                          </p:spTgt>
-                                        </p:tgtEl>
-                                        <p:attrNameLst>
-                                          <p:attrName>ppt_y</p:attrName>
-                                        </p:attrNameLst>
-                                      </p:cBhvr>
-                                      <p:tavLst>
-                                        <p:tav tm="0">
-                                          <p:val>
-                                            <p:strVal val="1+#ppt_h/2"/>
-                                          </p:val>
-                                        </p:tav>
-                                        <p:tav tm="100000">
-                                          <p:val>
-                                            <p:strVal val="#ppt_y"/>
-                                          </p:val>
-                                        </p:tav>
-                                      </p:tavLst>
-                                    </p:anim>
-                                  </p:childTnLst>
-                                </p:cTn>
-                              </p:par>
-                            </p:childTnLst>
-                          </p:cTn>
-                        </p:par>
-                      </p:childTnLst>
-                    </p:cTn>
-                  </p:par>
-                  <p:par>
-                    <p:cTn id="27" fill="hold">
-                      <p:stCondLst>
-                        <p:cond delay="indefinite"/>
-                      </p:stCondLst>
-                      <p:childTnLst>
-                        <p:par>
-                          <p:cTn id="28" fill="hold">
-                            <p:stCondLst>
-                              <p:cond delay="0"/>
-                            </p:stCondLst>
-                            <p:childTnLst>
-                              <p:par>
-                                <p:cTn id="29" presetID="2" presetClass="entr" presetSubtype="4" fill="hold" nodeType="clickEffect">
-                                  <p:stCondLst>
-                                    <p:cond delay="0"/>
-                                  </p:stCondLst>
-                                  <p:childTnLst>
-                                    <p:set>
-                                      <p:cBhvr>
-                                        <p:cTn id="30" dur="1" fill="hold">
-                                          <p:stCondLst>
-                                            <p:cond delay="0"/>
-                                          </p:stCondLst>
-                                        </p:cTn>
-                                        <p:tgtEl>
-                                          <p:spTgt spid="5">
-                                            <p:txEl>
-                                              <p:pRg st="4" end="4"/>
-                                            </p:txEl>
-                                          </p:spTgt>
-                                        </p:tgtEl>
-                                        <p:attrNameLst>
-                                          <p:attrName>style.visibility</p:attrName>
-                                        </p:attrNameLst>
-                                      </p:cBhvr>
-                                      <p:to>
-                                        <p:strVal val="visible"/>
-                                      </p:to>
-                                    </p:set>
-                                    <p:anim calcmode="lin" valueType="num">
-                                      <p:cBhvr additive="base">
-                                        <p:cTn id="31" dur="500" fill="hold"/>
-                                        <p:tgtEl>
-                                          <p:spTgt spid="5">
-                                            <p:txEl>
-                                              <p:pRg st="4" end="4"/>
-                                            </p:txEl>
-                                          </p:spTgt>
-                                        </p:tgtEl>
-                                        <p:attrNameLst>
-                                          <p:attrName>ppt_x</p:attrName>
-                                        </p:attrNameLst>
-                                      </p:cBhvr>
-                                      <p:tavLst>
-                                        <p:tav tm="0">
-                                          <p:val>
-                                            <p:strVal val="#ppt_x"/>
-                                          </p:val>
-                                        </p:tav>
-                                        <p:tav tm="100000">
-                                          <p:val>
-                                            <p:strVal val="#ppt_x"/>
-                                          </p:val>
-                                        </p:tav>
-                                      </p:tavLst>
-                                    </p:anim>
-                                    <p:anim calcmode="lin" valueType="num">
-                                      <p:cBhvr additive="base">
-                                        <p:cTn id="32" dur="500" fill="hold"/>
-                                        <p:tgtEl>
-                                          <p:spTgt spid="5">
-                                            <p:txEl>
-                                              <p:pRg st="4" end="4"/>
-                                            </p:txEl>
-                                          </p:spTgt>
-                                        </p:tgtEl>
-                                        <p:attrNameLst>
-                                          <p:attrName>ppt_y</p:attrName>
-                                        </p:attrNameLst>
-                                      </p:cBhvr>
-                                      <p:tavLst>
-                                        <p:tav tm="0">
-                                          <p:val>
-                                            <p:strVal val="1+#ppt_h/2"/>
-                                          </p:val>
-                                        </p:tav>
-                                        <p:tav tm="100000">
-                                          <p:val>
-                                            <p:strVal val="#ppt_y"/>
-                                          </p:val>
-                                        </p:tav>
-                                      </p:tavLst>
-                                    </p:anim>
-                                  </p:childTnLst>
-                                </p:cTn>
-                              </p:par>
-                            </p:childTnLst>
-                          </p:cTn>
-                        </p:par>
-                      </p:childTnLst>
-                    </p:cTn>
-                  </p:par>
-                  <p:par>
-                    <p:cTn id="33" fill="hold">
-                      <p:stCondLst>
-                        <p:cond delay="indefinite"/>
-                      </p:stCondLst>
-                      <p:childTnLst>
-                        <p:par>
-                          <p:cTn id="34" fill="hold">
-                            <p:stCondLst>
-                              <p:cond delay="0"/>
-                            </p:stCondLst>
-                            <p:childTnLst>
-                              <p:par>
-                                <p:cTn id="35" presetID="2" presetClass="entr" presetSubtype="4" fill="hold" nodeType="clickEffect">
-                                  <p:stCondLst>
-                                    <p:cond delay="0"/>
-                                  </p:stCondLst>
-                                  <p:childTnLst>
-                                    <p:set>
-                                      <p:cBhvr>
-                                        <p:cTn id="36" dur="1" fill="hold">
-                                          <p:stCondLst>
-                                            <p:cond delay="0"/>
-                                          </p:stCondLst>
-                                        </p:cTn>
-                                        <p:tgtEl>
-                                          <p:spTgt spid="5">
-                                            <p:txEl>
-                                              <p:pRg st="5" end="5"/>
-                                            </p:txEl>
-                                          </p:spTgt>
-                                        </p:tgtEl>
-                                        <p:attrNameLst>
-                                          <p:attrName>style.visibility</p:attrName>
-                                        </p:attrNameLst>
-                                      </p:cBhvr>
-                                      <p:to>
-                                        <p:strVal val="visible"/>
-                                      </p:to>
-                                    </p:set>
-                                    <p:anim calcmode="lin" valueType="num">
-                                      <p:cBhvr additive="base">
-                                        <p:cTn id="37" dur="500" fill="hold"/>
-                                        <p:tgtEl>
-                                          <p:spTgt spid="5">
-                                            <p:txEl>
-                                              <p:pRg st="5" end="5"/>
-                                            </p:txEl>
-                                          </p:spTgt>
-                                        </p:tgtEl>
-                                        <p:attrNameLst>
-                                          <p:attrName>ppt_x</p:attrName>
-                                        </p:attrNameLst>
-                                      </p:cBhvr>
-                                      <p:tavLst>
-                                        <p:tav tm="0">
-                                          <p:val>
-                                            <p:strVal val="#ppt_x"/>
-                                          </p:val>
-                                        </p:tav>
-                                        <p:tav tm="100000">
-                                          <p:val>
-                                            <p:strVal val="#ppt_x"/>
-                                          </p:val>
-                                        </p:tav>
-                                      </p:tavLst>
-                                    </p:anim>
-                                    <p:anim calcmode="lin" valueType="num">
-                                      <p:cBhvr additive="base">
-                                        <p:cTn id="38" dur="500" fill="hold"/>
-                                        <p:tgtEl>
-                                          <p:spTgt spid="5">
-                                            <p:txEl>
-                                              <p:pRg st="5" end="5"/>
-                                            </p:txEl>
-                                          </p:spTgt>
-                                        </p:tgtEl>
-                                        <p:attrNameLst>
-                                          <p:attrName>ppt_y</p:attrName>
-                                        </p:attrNameLst>
-                                      </p:cBhvr>
-                                      <p:tavLst>
-                                        <p:tav tm="0">
-                                          <p:val>
-                                            <p:strVal val="1+#ppt_h/2"/>
-                                          </p:val>
-                                        </p:tav>
-                                        <p:tav tm="100000">
-                                          <p:val>
-                                            <p:strVal val="#ppt_y"/>
-                                          </p:val>
-                                        </p:tav>
-                                      </p:tavLst>
-                                    </p:anim>
-                                  </p:childTnLst>
-                                </p:cTn>
-                              </p:par>
-                            </p:childTnLst>
-                          </p:cTn>
-                        </p:par>
-                      </p:childTnLst>
-                    </p:cTn>
-                  </p:par>
-                </p:childTnLst>
-              </p:cTn>
-              <p:prevCondLst>
-                <p:cond evt="onPrev" delay="0">
-                  <p:tgtEl>
-                    <p:sldTgt/>
-                  </p:tgtEl>
-                </p:cond>
-              </p:prevCondLst>
-              <p:nextCondLst>
-                <p:cond evt="onNext" delay="0">
-                  <p:tgtEl>
-                    <p:sldTgt/>
-                  </p:tgtEl>
-                </p:cond>
-              </p:nextCondLst>
-            </p:seq>
-          </p:childTnLst>
-        </p:cTn>
+        <p:cTn id="1" dur="indefinite" restart="never" nodeType="tmRoot"/>
       </p:par>
     </p:tnLst>
   </p:timing>
@@ -14892,957 +13808,7 @@
   <p:timing>
     <p:tnLst>
       <p:par>
-        <p:cTn id="1" dur="indefinite" restart="never" nodeType="tmRoot">
-          <p:childTnLst>
-            <p:seq concurrent="1" nextAc="seek">
-              <p:cTn id="2" dur="indefinite" nodeType="mainSeq">
-                <p:childTnLst>
-                  <p:par>
-                    <p:cTn id="3" fill="hold">
-                      <p:stCondLst>
-                        <p:cond delay="indefinite"/>
-                      </p:stCondLst>
-                      <p:childTnLst>
-                        <p:par>
-                          <p:cTn id="4" fill="hold">
-                            <p:stCondLst>
-                              <p:cond delay="0"/>
-                            </p:stCondLst>
-                            <p:childTnLst>
-                              <p:par>
-                                <p:cTn id="5" presetID="2" presetClass="entr" presetSubtype="4" fill="hold" nodeType="clickEffect">
-                                  <p:stCondLst>
-                                    <p:cond delay="0"/>
-                                  </p:stCondLst>
-                                  <p:childTnLst>
-                                    <p:set>
-                                      <p:cBhvr>
-                                        <p:cTn id="6" dur="1" fill="hold">
-                                          <p:stCondLst>
-                                            <p:cond delay="0"/>
-                                          </p:stCondLst>
-                                        </p:cTn>
-                                        <p:tgtEl>
-                                          <p:spTgt spid="5">
-                                            <p:txEl>
-                                              <p:pRg st="7" end="7"/>
-                                            </p:txEl>
-                                          </p:spTgt>
-                                        </p:tgtEl>
-                                        <p:attrNameLst>
-                                          <p:attrName>style.visibility</p:attrName>
-                                        </p:attrNameLst>
-                                      </p:cBhvr>
-                                      <p:to>
-                                        <p:strVal val="visible"/>
-                                      </p:to>
-                                    </p:set>
-                                    <p:anim calcmode="lin" valueType="num">
-                                      <p:cBhvr additive="base">
-                                        <p:cTn id="7" dur="500" fill="hold"/>
-                                        <p:tgtEl>
-                                          <p:spTgt spid="5">
-                                            <p:txEl>
-                                              <p:pRg st="7" end="7"/>
-                                            </p:txEl>
-                                          </p:spTgt>
-                                        </p:tgtEl>
-                                        <p:attrNameLst>
-                                          <p:attrName>ppt_x</p:attrName>
-                                        </p:attrNameLst>
-                                      </p:cBhvr>
-                                      <p:tavLst>
-                                        <p:tav tm="0">
-                                          <p:val>
-                                            <p:strVal val="#ppt_x"/>
-                                          </p:val>
-                                        </p:tav>
-                                        <p:tav tm="100000">
-                                          <p:val>
-                                            <p:strVal val="#ppt_x"/>
-                                          </p:val>
-                                        </p:tav>
-                                      </p:tavLst>
-                                    </p:anim>
-                                    <p:anim calcmode="lin" valueType="num">
-                                      <p:cBhvr additive="base">
-                                        <p:cTn id="8" dur="500" fill="hold"/>
-                                        <p:tgtEl>
-                                          <p:spTgt spid="5">
-                                            <p:txEl>
-                                              <p:pRg st="7" end="7"/>
-                                            </p:txEl>
-                                          </p:spTgt>
-                                        </p:tgtEl>
-                                        <p:attrNameLst>
-                                          <p:attrName>ppt_y</p:attrName>
-                                        </p:attrNameLst>
-                                      </p:cBhvr>
-                                      <p:tavLst>
-                                        <p:tav tm="0">
-                                          <p:val>
-                                            <p:strVal val="1+#ppt_h/2"/>
-                                          </p:val>
-                                        </p:tav>
-                                        <p:tav tm="100000">
-                                          <p:val>
-                                            <p:strVal val="#ppt_y"/>
-                                          </p:val>
-                                        </p:tav>
-                                      </p:tavLst>
-                                    </p:anim>
-                                  </p:childTnLst>
-                                </p:cTn>
-                              </p:par>
-                            </p:childTnLst>
-                          </p:cTn>
-                        </p:par>
-                      </p:childTnLst>
-                    </p:cTn>
-                  </p:par>
-                  <p:par>
-                    <p:cTn id="9" fill="hold">
-                      <p:stCondLst>
-                        <p:cond delay="indefinite"/>
-                      </p:stCondLst>
-                      <p:childTnLst>
-                        <p:par>
-                          <p:cTn id="10" fill="hold">
-                            <p:stCondLst>
-                              <p:cond delay="0"/>
-                            </p:stCondLst>
-                            <p:childTnLst>
-                              <p:par>
-                                <p:cTn id="11" presetID="2" presetClass="entr" presetSubtype="4" fill="hold" nodeType="clickEffect">
-                                  <p:stCondLst>
-                                    <p:cond delay="0"/>
-                                  </p:stCondLst>
-                                  <p:childTnLst>
-                                    <p:set>
-                                      <p:cBhvr>
-                                        <p:cTn id="12" dur="1" fill="hold">
-                                          <p:stCondLst>
-                                            <p:cond delay="0"/>
-                                          </p:stCondLst>
-                                        </p:cTn>
-                                        <p:tgtEl>
-                                          <p:spTgt spid="5">
-                                            <p:txEl>
-                                              <p:pRg st="0" end="0"/>
-                                            </p:txEl>
-                                          </p:spTgt>
-                                        </p:tgtEl>
-                                        <p:attrNameLst>
-                                          <p:attrName>style.visibility</p:attrName>
-                                        </p:attrNameLst>
-                                      </p:cBhvr>
-                                      <p:to>
-                                        <p:strVal val="visible"/>
-                                      </p:to>
-                                    </p:set>
-                                    <p:anim calcmode="lin" valueType="num">
-                                      <p:cBhvr additive="base">
-                                        <p:cTn id="13" dur="500" fill="hold"/>
-                                        <p:tgtEl>
-                                          <p:spTgt spid="5">
-                                            <p:txEl>
-                                              <p:pRg st="0" end="0"/>
-                                            </p:txEl>
-                                          </p:spTgt>
-                                        </p:tgtEl>
-                                        <p:attrNameLst>
-                                          <p:attrName>ppt_x</p:attrName>
-                                        </p:attrNameLst>
-                                      </p:cBhvr>
-                                      <p:tavLst>
-                                        <p:tav tm="0">
-                                          <p:val>
-                                            <p:strVal val="#ppt_x"/>
-                                          </p:val>
-                                        </p:tav>
-                                        <p:tav tm="100000">
-                                          <p:val>
-                                            <p:strVal val="#ppt_x"/>
-                                          </p:val>
-                                        </p:tav>
-                                      </p:tavLst>
-                                    </p:anim>
-                                    <p:anim calcmode="lin" valueType="num">
-                                      <p:cBhvr additive="base">
-                                        <p:cTn id="14" dur="500" fill="hold"/>
-                                        <p:tgtEl>
-                                          <p:spTgt spid="5">
-                                            <p:txEl>
-                                              <p:pRg st="0" end="0"/>
-                                            </p:txEl>
-                                          </p:spTgt>
-                                        </p:tgtEl>
-                                        <p:attrNameLst>
-                                          <p:attrName>ppt_y</p:attrName>
-                                        </p:attrNameLst>
-                                      </p:cBhvr>
-                                      <p:tavLst>
-                                        <p:tav tm="0">
-                                          <p:val>
-                                            <p:strVal val="1+#ppt_h/2"/>
-                                          </p:val>
-                                        </p:tav>
-                                        <p:tav tm="100000">
-                                          <p:val>
-                                            <p:strVal val="#ppt_y"/>
-                                          </p:val>
-                                        </p:tav>
-                                      </p:tavLst>
-                                    </p:anim>
-                                  </p:childTnLst>
-                                </p:cTn>
-                              </p:par>
-                            </p:childTnLst>
-                          </p:cTn>
-                        </p:par>
-                      </p:childTnLst>
-                    </p:cTn>
-                  </p:par>
-                  <p:par>
-                    <p:cTn id="15" fill="hold">
-                      <p:stCondLst>
-                        <p:cond delay="indefinite"/>
-                      </p:stCondLst>
-                      <p:childTnLst>
-                        <p:par>
-                          <p:cTn id="16" fill="hold">
-                            <p:stCondLst>
-                              <p:cond delay="0"/>
-                            </p:stCondLst>
-                            <p:childTnLst>
-                              <p:par>
-                                <p:cTn id="17" presetID="2" presetClass="entr" presetSubtype="4" fill="hold" nodeType="clickEffect">
-                                  <p:stCondLst>
-                                    <p:cond delay="0"/>
-                                  </p:stCondLst>
-                                  <p:childTnLst>
-                                    <p:set>
-                                      <p:cBhvr>
-                                        <p:cTn id="18" dur="1" fill="hold">
-                                          <p:stCondLst>
-                                            <p:cond delay="0"/>
-                                          </p:stCondLst>
-                                        </p:cTn>
-                                        <p:tgtEl>
-                                          <p:spTgt spid="5">
-                                            <p:txEl>
-                                              <p:pRg st="1" end="1"/>
-                                            </p:txEl>
-                                          </p:spTgt>
-                                        </p:tgtEl>
-                                        <p:attrNameLst>
-                                          <p:attrName>style.visibility</p:attrName>
-                                        </p:attrNameLst>
-                                      </p:cBhvr>
-                                      <p:to>
-                                        <p:strVal val="visible"/>
-                                      </p:to>
-                                    </p:set>
-                                    <p:anim calcmode="lin" valueType="num">
-                                      <p:cBhvr additive="base">
-                                        <p:cTn id="19" dur="500" fill="hold"/>
-                                        <p:tgtEl>
-                                          <p:spTgt spid="5">
-                                            <p:txEl>
-                                              <p:pRg st="1" end="1"/>
-                                            </p:txEl>
-                                          </p:spTgt>
-                                        </p:tgtEl>
-                                        <p:attrNameLst>
-                                          <p:attrName>ppt_x</p:attrName>
-                                        </p:attrNameLst>
-                                      </p:cBhvr>
-                                      <p:tavLst>
-                                        <p:tav tm="0">
-                                          <p:val>
-                                            <p:strVal val="#ppt_x"/>
-                                          </p:val>
-                                        </p:tav>
-                                        <p:tav tm="100000">
-                                          <p:val>
-                                            <p:strVal val="#ppt_x"/>
-                                          </p:val>
-                                        </p:tav>
-                                      </p:tavLst>
-                                    </p:anim>
-                                    <p:anim calcmode="lin" valueType="num">
-                                      <p:cBhvr additive="base">
-                                        <p:cTn id="20" dur="500" fill="hold"/>
-                                        <p:tgtEl>
-                                          <p:spTgt spid="5">
-                                            <p:txEl>
-                                              <p:pRg st="1" end="1"/>
-                                            </p:txEl>
-                                          </p:spTgt>
-                                        </p:tgtEl>
-                                        <p:attrNameLst>
-                                          <p:attrName>ppt_y</p:attrName>
-                                        </p:attrNameLst>
-                                      </p:cBhvr>
-                                      <p:tavLst>
-                                        <p:tav tm="0">
-                                          <p:val>
-                                            <p:strVal val="1+#ppt_h/2"/>
-                                          </p:val>
-                                        </p:tav>
-                                        <p:tav tm="100000">
-                                          <p:val>
-                                            <p:strVal val="#ppt_y"/>
-                                          </p:val>
-                                        </p:tav>
-                                      </p:tavLst>
-                                    </p:anim>
-                                  </p:childTnLst>
-                                </p:cTn>
-                              </p:par>
-                            </p:childTnLst>
-                          </p:cTn>
-                        </p:par>
-                      </p:childTnLst>
-                    </p:cTn>
-                  </p:par>
-                  <p:par>
-                    <p:cTn id="21" fill="hold">
-                      <p:stCondLst>
-                        <p:cond delay="indefinite"/>
-                      </p:stCondLst>
-                      <p:childTnLst>
-                        <p:par>
-                          <p:cTn id="22" fill="hold">
-                            <p:stCondLst>
-                              <p:cond delay="0"/>
-                            </p:stCondLst>
-                            <p:childTnLst>
-                              <p:par>
-                                <p:cTn id="23" presetID="2" presetClass="entr" presetSubtype="4" fill="hold" nodeType="clickEffect">
-                                  <p:stCondLst>
-                                    <p:cond delay="0"/>
-                                  </p:stCondLst>
-                                  <p:childTnLst>
-                                    <p:set>
-                                      <p:cBhvr>
-                                        <p:cTn id="24" dur="1" fill="hold">
-                                          <p:stCondLst>
-                                            <p:cond delay="0"/>
-                                          </p:stCondLst>
-                                        </p:cTn>
-                                        <p:tgtEl>
-                                          <p:spTgt spid="5">
-                                            <p:txEl>
-                                              <p:pRg st="8" end="8"/>
-                                            </p:txEl>
-                                          </p:spTgt>
-                                        </p:tgtEl>
-                                        <p:attrNameLst>
-                                          <p:attrName>style.visibility</p:attrName>
-                                        </p:attrNameLst>
-                                      </p:cBhvr>
-                                      <p:to>
-                                        <p:strVal val="visible"/>
-                                      </p:to>
-                                    </p:set>
-                                    <p:anim calcmode="lin" valueType="num">
-                                      <p:cBhvr additive="base">
-                                        <p:cTn id="25" dur="500" fill="hold"/>
-                                        <p:tgtEl>
-                                          <p:spTgt spid="5">
-                                            <p:txEl>
-                                              <p:pRg st="8" end="8"/>
-                                            </p:txEl>
-                                          </p:spTgt>
-                                        </p:tgtEl>
-                                        <p:attrNameLst>
-                                          <p:attrName>ppt_x</p:attrName>
-                                        </p:attrNameLst>
-                                      </p:cBhvr>
-                                      <p:tavLst>
-                                        <p:tav tm="0">
-                                          <p:val>
-                                            <p:strVal val="#ppt_x"/>
-                                          </p:val>
-                                        </p:tav>
-                                        <p:tav tm="100000">
-                                          <p:val>
-                                            <p:strVal val="#ppt_x"/>
-                                          </p:val>
-                                        </p:tav>
-                                      </p:tavLst>
-                                    </p:anim>
-                                    <p:anim calcmode="lin" valueType="num">
-                                      <p:cBhvr additive="base">
-                                        <p:cTn id="26" dur="500" fill="hold"/>
-                                        <p:tgtEl>
-                                          <p:spTgt spid="5">
-                                            <p:txEl>
-                                              <p:pRg st="8" end="8"/>
-                                            </p:txEl>
-                                          </p:spTgt>
-                                        </p:tgtEl>
-                                        <p:attrNameLst>
-                                          <p:attrName>ppt_y</p:attrName>
-                                        </p:attrNameLst>
-                                      </p:cBhvr>
-                                      <p:tavLst>
-                                        <p:tav tm="0">
-                                          <p:val>
-                                            <p:strVal val="1+#ppt_h/2"/>
-                                          </p:val>
-                                        </p:tav>
-                                        <p:tav tm="100000">
-                                          <p:val>
-                                            <p:strVal val="#ppt_y"/>
-                                          </p:val>
-                                        </p:tav>
-                                      </p:tavLst>
-                                    </p:anim>
-                                  </p:childTnLst>
-                                </p:cTn>
-                              </p:par>
-                            </p:childTnLst>
-                          </p:cTn>
-                        </p:par>
-                      </p:childTnLst>
-                    </p:cTn>
-                  </p:par>
-                  <p:par>
-                    <p:cTn id="27" fill="hold">
-                      <p:stCondLst>
-                        <p:cond delay="indefinite"/>
-                      </p:stCondLst>
-                      <p:childTnLst>
-                        <p:par>
-                          <p:cTn id="28" fill="hold">
-                            <p:stCondLst>
-                              <p:cond delay="0"/>
-                            </p:stCondLst>
-                            <p:childTnLst>
-                              <p:par>
-                                <p:cTn id="29" presetID="2" presetClass="entr" presetSubtype="4" fill="hold" nodeType="clickEffect">
-                                  <p:stCondLst>
-                                    <p:cond delay="0"/>
-                                  </p:stCondLst>
-                                  <p:childTnLst>
-                                    <p:set>
-                                      <p:cBhvr>
-                                        <p:cTn id="30" dur="1" fill="hold">
-                                          <p:stCondLst>
-                                            <p:cond delay="0"/>
-                                          </p:stCondLst>
-                                        </p:cTn>
-                                        <p:tgtEl>
-                                          <p:spTgt spid="5">
-                                            <p:txEl>
-                                              <p:pRg st="9" end="9"/>
-                                            </p:txEl>
-                                          </p:spTgt>
-                                        </p:tgtEl>
-                                        <p:attrNameLst>
-                                          <p:attrName>style.visibility</p:attrName>
-                                        </p:attrNameLst>
-                                      </p:cBhvr>
-                                      <p:to>
-                                        <p:strVal val="visible"/>
-                                      </p:to>
-                                    </p:set>
-                                    <p:anim calcmode="lin" valueType="num">
-                                      <p:cBhvr additive="base">
-                                        <p:cTn id="31" dur="500" fill="hold"/>
-                                        <p:tgtEl>
-                                          <p:spTgt spid="5">
-                                            <p:txEl>
-                                              <p:pRg st="9" end="9"/>
-                                            </p:txEl>
-                                          </p:spTgt>
-                                        </p:tgtEl>
-                                        <p:attrNameLst>
-                                          <p:attrName>ppt_x</p:attrName>
-                                        </p:attrNameLst>
-                                      </p:cBhvr>
-                                      <p:tavLst>
-                                        <p:tav tm="0">
-                                          <p:val>
-                                            <p:strVal val="#ppt_x"/>
-                                          </p:val>
-                                        </p:tav>
-                                        <p:tav tm="100000">
-                                          <p:val>
-                                            <p:strVal val="#ppt_x"/>
-                                          </p:val>
-                                        </p:tav>
-                                      </p:tavLst>
-                                    </p:anim>
-                                    <p:anim calcmode="lin" valueType="num">
-                                      <p:cBhvr additive="base">
-                                        <p:cTn id="32" dur="500" fill="hold"/>
-                                        <p:tgtEl>
-                                          <p:spTgt spid="5">
-                                            <p:txEl>
-                                              <p:pRg st="9" end="9"/>
-                                            </p:txEl>
-                                          </p:spTgt>
-                                        </p:tgtEl>
-                                        <p:attrNameLst>
-                                          <p:attrName>ppt_y</p:attrName>
-                                        </p:attrNameLst>
-                                      </p:cBhvr>
-                                      <p:tavLst>
-                                        <p:tav tm="0">
-                                          <p:val>
-                                            <p:strVal val="1+#ppt_h/2"/>
-                                          </p:val>
-                                        </p:tav>
-                                        <p:tav tm="100000">
-                                          <p:val>
-                                            <p:strVal val="#ppt_y"/>
-                                          </p:val>
-                                        </p:tav>
-                                      </p:tavLst>
-                                    </p:anim>
-                                  </p:childTnLst>
-                                </p:cTn>
-                              </p:par>
-                            </p:childTnLst>
-                          </p:cTn>
-                        </p:par>
-                      </p:childTnLst>
-                    </p:cTn>
-                  </p:par>
-                  <p:par>
-                    <p:cTn id="33" fill="hold">
-                      <p:stCondLst>
-                        <p:cond delay="indefinite"/>
-                      </p:stCondLst>
-                      <p:childTnLst>
-                        <p:par>
-                          <p:cTn id="34" fill="hold">
-                            <p:stCondLst>
-                              <p:cond delay="0"/>
-                            </p:stCondLst>
-                            <p:childTnLst>
-                              <p:par>
-                                <p:cTn id="35" presetID="2" presetClass="entr" presetSubtype="4" fill="hold" nodeType="clickEffect">
-                                  <p:stCondLst>
-                                    <p:cond delay="0"/>
-                                  </p:stCondLst>
-                                  <p:childTnLst>
-                                    <p:set>
-                                      <p:cBhvr>
-                                        <p:cTn id="36" dur="1" fill="hold">
-                                          <p:stCondLst>
-                                            <p:cond delay="0"/>
-                                          </p:stCondLst>
-                                        </p:cTn>
-                                        <p:tgtEl>
-                                          <p:spTgt spid="5">
-                                            <p:txEl>
-                                              <p:pRg st="10" end="10"/>
-                                            </p:txEl>
-                                          </p:spTgt>
-                                        </p:tgtEl>
-                                        <p:attrNameLst>
-                                          <p:attrName>style.visibility</p:attrName>
-                                        </p:attrNameLst>
-                                      </p:cBhvr>
-                                      <p:to>
-                                        <p:strVal val="visible"/>
-                                      </p:to>
-                                    </p:set>
-                                    <p:anim calcmode="lin" valueType="num">
-                                      <p:cBhvr additive="base">
-                                        <p:cTn id="37" dur="500" fill="hold"/>
-                                        <p:tgtEl>
-                                          <p:spTgt spid="5">
-                                            <p:txEl>
-                                              <p:pRg st="10" end="10"/>
-                                            </p:txEl>
-                                          </p:spTgt>
-                                        </p:tgtEl>
-                                        <p:attrNameLst>
-                                          <p:attrName>ppt_x</p:attrName>
-                                        </p:attrNameLst>
-                                      </p:cBhvr>
-                                      <p:tavLst>
-                                        <p:tav tm="0">
-                                          <p:val>
-                                            <p:strVal val="#ppt_x"/>
-                                          </p:val>
-                                        </p:tav>
-                                        <p:tav tm="100000">
-                                          <p:val>
-                                            <p:strVal val="#ppt_x"/>
-                                          </p:val>
-                                        </p:tav>
-                                      </p:tavLst>
-                                    </p:anim>
-                                    <p:anim calcmode="lin" valueType="num">
-                                      <p:cBhvr additive="base">
-                                        <p:cTn id="38" dur="500" fill="hold"/>
-                                        <p:tgtEl>
-                                          <p:spTgt spid="5">
-                                            <p:txEl>
-                                              <p:pRg st="10" end="10"/>
-                                            </p:txEl>
-                                          </p:spTgt>
-                                        </p:tgtEl>
-                                        <p:attrNameLst>
-                                          <p:attrName>ppt_y</p:attrName>
-                                        </p:attrNameLst>
-                                      </p:cBhvr>
-                                      <p:tavLst>
-                                        <p:tav tm="0">
-                                          <p:val>
-                                            <p:strVal val="1+#ppt_h/2"/>
-                                          </p:val>
-                                        </p:tav>
-                                        <p:tav tm="100000">
-                                          <p:val>
-                                            <p:strVal val="#ppt_y"/>
-                                          </p:val>
-                                        </p:tav>
-                                      </p:tavLst>
-                                    </p:anim>
-                                  </p:childTnLst>
-                                </p:cTn>
-                              </p:par>
-                            </p:childTnLst>
-                          </p:cTn>
-                        </p:par>
-                      </p:childTnLst>
-                    </p:cTn>
-                  </p:par>
-                  <p:par>
-                    <p:cTn id="39" fill="hold">
-                      <p:stCondLst>
-                        <p:cond delay="indefinite"/>
-                      </p:stCondLst>
-                      <p:childTnLst>
-                        <p:par>
-                          <p:cTn id="40" fill="hold">
-                            <p:stCondLst>
-                              <p:cond delay="0"/>
-                            </p:stCondLst>
-                            <p:childTnLst>
-                              <p:par>
-                                <p:cTn id="41" presetID="2" presetClass="entr" presetSubtype="4" fill="hold" nodeType="clickEffect">
-                                  <p:stCondLst>
-                                    <p:cond delay="0"/>
-                                  </p:stCondLst>
-                                  <p:childTnLst>
-                                    <p:set>
-                                      <p:cBhvr>
-                                        <p:cTn id="42" dur="1" fill="hold">
-                                          <p:stCondLst>
-                                            <p:cond delay="0"/>
-                                          </p:stCondLst>
-                                        </p:cTn>
-                                        <p:tgtEl>
-                                          <p:spTgt spid="5">
-                                            <p:txEl>
-                                              <p:pRg st="11" end="11"/>
-                                            </p:txEl>
-                                          </p:spTgt>
-                                        </p:tgtEl>
-                                        <p:attrNameLst>
-                                          <p:attrName>style.visibility</p:attrName>
-                                        </p:attrNameLst>
-                                      </p:cBhvr>
-                                      <p:to>
-                                        <p:strVal val="visible"/>
-                                      </p:to>
-                                    </p:set>
-                                    <p:anim calcmode="lin" valueType="num">
-                                      <p:cBhvr additive="base">
-                                        <p:cTn id="43" dur="500" fill="hold"/>
-                                        <p:tgtEl>
-                                          <p:spTgt spid="5">
-                                            <p:txEl>
-                                              <p:pRg st="11" end="11"/>
-                                            </p:txEl>
-                                          </p:spTgt>
-                                        </p:tgtEl>
-                                        <p:attrNameLst>
-                                          <p:attrName>ppt_x</p:attrName>
-                                        </p:attrNameLst>
-                                      </p:cBhvr>
-                                      <p:tavLst>
-                                        <p:tav tm="0">
-                                          <p:val>
-                                            <p:strVal val="#ppt_x"/>
-                                          </p:val>
-                                        </p:tav>
-                                        <p:tav tm="100000">
-                                          <p:val>
-                                            <p:strVal val="#ppt_x"/>
-                                          </p:val>
-                                        </p:tav>
-                                      </p:tavLst>
-                                    </p:anim>
-                                    <p:anim calcmode="lin" valueType="num">
-                                      <p:cBhvr additive="base">
-                                        <p:cTn id="44" dur="500" fill="hold"/>
-                                        <p:tgtEl>
-                                          <p:spTgt spid="5">
-                                            <p:txEl>
-                                              <p:pRg st="11" end="11"/>
-                                            </p:txEl>
-                                          </p:spTgt>
-                                        </p:tgtEl>
-                                        <p:attrNameLst>
-                                          <p:attrName>ppt_y</p:attrName>
-                                        </p:attrNameLst>
-                                      </p:cBhvr>
-                                      <p:tavLst>
-                                        <p:tav tm="0">
-                                          <p:val>
-                                            <p:strVal val="1+#ppt_h/2"/>
-                                          </p:val>
-                                        </p:tav>
-                                        <p:tav tm="100000">
-                                          <p:val>
-                                            <p:strVal val="#ppt_y"/>
-                                          </p:val>
-                                        </p:tav>
-                                      </p:tavLst>
-                                    </p:anim>
-                                  </p:childTnLst>
-                                </p:cTn>
-                              </p:par>
-                            </p:childTnLst>
-                          </p:cTn>
-                        </p:par>
-                      </p:childTnLst>
-                    </p:cTn>
-                  </p:par>
-                  <p:par>
-                    <p:cTn id="45" fill="hold">
-                      <p:stCondLst>
-                        <p:cond delay="indefinite"/>
-                      </p:stCondLst>
-                      <p:childTnLst>
-                        <p:par>
-                          <p:cTn id="46" fill="hold">
-                            <p:stCondLst>
-                              <p:cond delay="0"/>
-                            </p:stCondLst>
-                            <p:childTnLst>
-                              <p:par>
-                                <p:cTn id="47" presetID="2" presetClass="entr" presetSubtype="4" fill="hold" nodeType="clickEffect">
-                                  <p:stCondLst>
-                                    <p:cond delay="0"/>
-                                  </p:stCondLst>
-                                  <p:childTnLst>
-                                    <p:set>
-                                      <p:cBhvr>
-                                        <p:cTn id="48" dur="1" fill="hold">
-                                          <p:stCondLst>
-                                            <p:cond delay="0"/>
-                                          </p:stCondLst>
-                                        </p:cTn>
-                                        <p:tgtEl>
-                                          <p:spTgt spid="5">
-                                            <p:txEl>
-                                              <p:pRg st="12" end="12"/>
-                                            </p:txEl>
-                                          </p:spTgt>
-                                        </p:tgtEl>
-                                        <p:attrNameLst>
-                                          <p:attrName>style.visibility</p:attrName>
-                                        </p:attrNameLst>
-                                      </p:cBhvr>
-                                      <p:to>
-                                        <p:strVal val="visible"/>
-                                      </p:to>
-                                    </p:set>
-                                    <p:anim calcmode="lin" valueType="num">
-                                      <p:cBhvr additive="base">
-                                        <p:cTn id="49" dur="500" fill="hold"/>
-                                        <p:tgtEl>
-                                          <p:spTgt spid="5">
-                                            <p:txEl>
-                                              <p:pRg st="12" end="12"/>
-                                            </p:txEl>
-                                          </p:spTgt>
-                                        </p:tgtEl>
-                                        <p:attrNameLst>
-                                          <p:attrName>ppt_x</p:attrName>
-                                        </p:attrNameLst>
-                                      </p:cBhvr>
-                                      <p:tavLst>
-                                        <p:tav tm="0">
-                                          <p:val>
-                                            <p:strVal val="#ppt_x"/>
-                                          </p:val>
-                                        </p:tav>
-                                        <p:tav tm="100000">
-                                          <p:val>
-                                            <p:strVal val="#ppt_x"/>
-                                          </p:val>
-                                        </p:tav>
-                                      </p:tavLst>
-                                    </p:anim>
-                                    <p:anim calcmode="lin" valueType="num">
-                                      <p:cBhvr additive="base">
-                                        <p:cTn id="50" dur="500" fill="hold"/>
-                                        <p:tgtEl>
-                                          <p:spTgt spid="5">
-                                            <p:txEl>
-                                              <p:pRg st="12" end="12"/>
-                                            </p:txEl>
-                                          </p:spTgt>
-                                        </p:tgtEl>
-                                        <p:attrNameLst>
-                                          <p:attrName>ppt_y</p:attrName>
-                                        </p:attrNameLst>
-                                      </p:cBhvr>
-                                      <p:tavLst>
-                                        <p:tav tm="0">
-                                          <p:val>
-                                            <p:strVal val="1+#ppt_h/2"/>
-                                          </p:val>
-                                        </p:tav>
-                                        <p:tav tm="100000">
-                                          <p:val>
-                                            <p:strVal val="#ppt_y"/>
-                                          </p:val>
-                                        </p:tav>
-                                      </p:tavLst>
-                                    </p:anim>
-                                  </p:childTnLst>
-                                </p:cTn>
-                              </p:par>
-                            </p:childTnLst>
-                          </p:cTn>
-                        </p:par>
-                      </p:childTnLst>
-                    </p:cTn>
-                  </p:par>
-                  <p:par>
-                    <p:cTn id="51" fill="hold">
-                      <p:stCondLst>
-                        <p:cond delay="indefinite"/>
-                      </p:stCondLst>
-                      <p:childTnLst>
-                        <p:par>
-                          <p:cTn id="52" fill="hold">
-                            <p:stCondLst>
-                              <p:cond delay="0"/>
-                            </p:stCondLst>
-                            <p:childTnLst>
-                              <p:par>
-                                <p:cTn id="53" presetID="2" presetClass="entr" presetSubtype="4" fill="hold" nodeType="clickEffect">
-                                  <p:stCondLst>
-                                    <p:cond delay="0"/>
-                                  </p:stCondLst>
-                                  <p:childTnLst>
-                                    <p:set>
-                                      <p:cBhvr>
-                                        <p:cTn id="54" dur="1" fill="hold">
-                                          <p:stCondLst>
-                                            <p:cond delay="0"/>
-                                          </p:stCondLst>
-                                        </p:cTn>
-                                        <p:tgtEl>
-                                          <p:spTgt spid="5">
-                                            <p:txEl>
-                                              <p:pRg st="13" end="13"/>
-                                            </p:txEl>
-                                          </p:spTgt>
-                                        </p:tgtEl>
-                                        <p:attrNameLst>
-                                          <p:attrName>style.visibility</p:attrName>
-                                        </p:attrNameLst>
-                                      </p:cBhvr>
-                                      <p:to>
-                                        <p:strVal val="visible"/>
-                                      </p:to>
-                                    </p:set>
-                                    <p:anim calcmode="lin" valueType="num">
-                                      <p:cBhvr additive="base">
-                                        <p:cTn id="55" dur="500" fill="hold"/>
-                                        <p:tgtEl>
-                                          <p:spTgt spid="5">
-                                            <p:txEl>
-                                              <p:pRg st="13" end="13"/>
-                                            </p:txEl>
-                                          </p:spTgt>
-                                        </p:tgtEl>
-                                        <p:attrNameLst>
-                                          <p:attrName>ppt_x</p:attrName>
-                                        </p:attrNameLst>
-                                      </p:cBhvr>
-                                      <p:tavLst>
-                                        <p:tav tm="0">
-                                          <p:val>
-                                            <p:strVal val="#ppt_x"/>
-                                          </p:val>
-                                        </p:tav>
-                                        <p:tav tm="100000">
-                                          <p:val>
-                                            <p:strVal val="#ppt_x"/>
-                                          </p:val>
-                                        </p:tav>
-                                      </p:tavLst>
-                                    </p:anim>
-                                    <p:anim calcmode="lin" valueType="num">
-                                      <p:cBhvr additive="base">
-                                        <p:cTn id="56" dur="500" fill="hold"/>
-                                        <p:tgtEl>
-                                          <p:spTgt spid="5">
-                                            <p:txEl>
-                                              <p:pRg st="13" end="13"/>
-                                            </p:txEl>
-                                          </p:spTgt>
-                                        </p:tgtEl>
-                                        <p:attrNameLst>
-                                          <p:attrName>ppt_y</p:attrName>
-                                        </p:attrNameLst>
-                                      </p:cBhvr>
-                                      <p:tavLst>
-                                        <p:tav tm="0">
-                                          <p:val>
-                                            <p:strVal val="1+#ppt_h/2"/>
-                                          </p:val>
-                                        </p:tav>
-                                        <p:tav tm="100000">
-                                          <p:val>
-                                            <p:strVal val="#ppt_y"/>
-                                          </p:val>
-                                        </p:tav>
-                                      </p:tavLst>
-                                    </p:anim>
-                                  </p:childTnLst>
-                                </p:cTn>
-                              </p:par>
-                            </p:childTnLst>
-                          </p:cTn>
-                        </p:par>
-                      </p:childTnLst>
-                    </p:cTn>
-                  </p:par>
-                </p:childTnLst>
-              </p:cTn>
-              <p:prevCondLst>
-                <p:cond evt="onPrev" delay="0">
-                  <p:tgtEl>
-                    <p:sldTgt/>
-                  </p:tgtEl>
-                </p:cond>
-              </p:prevCondLst>
-              <p:nextCondLst>
-                <p:cond evt="onNext" delay="0">
-                  <p:tgtEl>
-                    <p:sldTgt/>
-                  </p:tgtEl>
-                </p:cond>
-              </p:nextCondLst>
-            </p:seq>
-          </p:childTnLst>
-        </p:cTn>
+        <p:cTn id="1" dur="indefinite" restart="never" nodeType="tmRoot"/>
       </p:par>
     </p:tnLst>
   </p:timing>
@@ -16468,545 +14434,7 @@
   <p:timing>
     <p:tnLst>
       <p:par>
-        <p:cTn id="1" dur="indefinite" restart="never" nodeType="tmRoot">
-          <p:childTnLst>
-            <p:seq concurrent="1" nextAc="seek">
-              <p:cTn id="2" dur="indefinite" nodeType="mainSeq">
-                <p:childTnLst>
-                  <p:par>
-                    <p:cTn id="3" fill="hold">
-                      <p:stCondLst>
-                        <p:cond delay="indefinite"/>
-                      </p:stCondLst>
-                      <p:childTnLst>
-                        <p:par>
-                          <p:cTn id="4" fill="hold">
-                            <p:stCondLst>
-                              <p:cond delay="0"/>
-                            </p:stCondLst>
-                            <p:childTnLst>
-                              <p:par>
-                                <p:cTn id="5" presetID="2" presetClass="entr" presetSubtype="4" fill="hold" nodeType="clickEffect">
-                                  <p:stCondLst>
-                                    <p:cond delay="0"/>
-                                  </p:stCondLst>
-                                  <p:childTnLst>
-                                    <p:set>
-                                      <p:cBhvr>
-                                        <p:cTn id="6" dur="1" fill="hold">
-                                          <p:stCondLst>
-                                            <p:cond delay="0"/>
-                                          </p:stCondLst>
-                                        </p:cTn>
-                                        <p:tgtEl>
-                                          <p:spTgt spid="7170">
-                                            <p:txEl>
-                                              <p:pRg st="0" end="0"/>
-                                            </p:txEl>
-                                          </p:spTgt>
-                                        </p:tgtEl>
-                                        <p:attrNameLst>
-                                          <p:attrName>style.visibility</p:attrName>
-                                        </p:attrNameLst>
-                                      </p:cBhvr>
-                                      <p:to>
-                                        <p:strVal val="visible"/>
-                                      </p:to>
-                                    </p:set>
-                                    <p:anim calcmode="lin" valueType="num">
-                                      <p:cBhvr additive="base">
-                                        <p:cTn id="7" dur="500" fill="hold"/>
-                                        <p:tgtEl>
-                                          <p:spTgt spid="7170">
-                                            <p:txEl>
-                                              <p:pRg st="0" end="0"/>
-                                            </p:txEl>
-                                          </p:spTgt>
-                                        </p:tgtEl>
-                                        <p:attrNameLst>
-                                          <p:attrName>ppt_x</p:attrName>
-                                        </p:attrNameLst>
-                                      </p:cBhvr>
-                                      <p:tavLst>
-                                        <p:tav tm="0">
-                                          <p:val>
-                                            <p:strVal val="#ppt_x"/>
-                                          </p:val>
-                                        </p:tav>
-                                        <p:tav tm="100000">
-                                          <p:val>
-                                            <p:strVal val="#ppt_x"/>
-                                          </p:val>
-                                        </p:tav>
-                                      </p:tavLst>
-                                    </p:anim>
-                                    <p:anim calcmode="lin" valueType="num">
-                                      <p:cBhvr additive="base">
-                                        <p:cTn id="8" dur="500" fill="hold"/>
-                                        <p:tgtEl>
-                                          <p:spTgt spid="7170">
-                                            <p:txEl>
-                                              <p:pRg st="0" end="0"/>
-                                            </p:txEl>
-                                          </p:spTgt>
-                                        </p:tgtEl>
-                                        <p:attrNameLst>
-                                          <p:attrName>ppt_y</p:attrName>
-                                        </p:attrNameLst>
-                                      </p:cBhvr>
-                                      <p:tavLst>
-                                        <p:tav tm="0">
-                                          <p:val>
-                                            <p:strVal val="1+#ppt_h/2"/>
-                                          </p:val>
-                                        </p:tav>
-                                        <p:tav tm="100000">
-                                          <p:val>
-                                            <p:strVal val="#ppt_y"/>
-                                          </p:val>
-                                        </p:tav>
-                                      </p:tavLst>
-                                    </p:anim>
-                                  </p:childTnLst>
-                                </p:cTn>
-                              </p:par>
-                            </p:childTnLst>
-                          </p:cTn>
-                        </p:par>
-                      </p:childTnLst>
-                    </p:cTn>
-                  </p:par>
-                  <p:par>
-                    <p:cTn id="9" fill="hold">
-                      <p:stCondLst>
-                        <p:cond delay="indefinite"/>
-                      </p:stCondLst>
-                      <p:childTnLst>
-                        <p:par>
-                          <p:cTn id="10" fill="hold">
-                            <p:stCondLst>
-                              <p:cond delay="0"/>
-                            </p:stCondLst>
-                            <p:childTnLst>
-                              <p:par>
-                                <p:cTn id="11" presetID="2" presetClass="entr" presetSubtype="4" fill="hold" nodeType="clickEffect">
-                                  <p:stCondLst>
-                                    <p:cond delay="0"/>
-                                  </p:stCondLst>
-                                  <p:childTnLst>
-                                    <p:set>
-                                      <p:cBhvr>
-                                        <p:cTn id="12" dur="1" fill="hold">
-                                          <p:stCondLst>
-                                            <p:cond delay="0"/>
-                                          </p:stCondLst>
-                                        </p:cTn>
-                                        <p:tgtEl>
-                                          <p:spTgt spid="7170">
-                                            <p:txEl>
-                                              <p:pRg st="1" end="1"/>
-                                            </p:txEl>
-                                          </p:spTgt>
-                                        </p:tgtEl>
-                                        <p:attrNameLst>
-                                          <p:attrName>style.visibility</p:attrName>
-                                        </p:attrNameLst>
-                                      </p:cBhvr>
-                                      <p:to>
-                                        <p:strVal val="visible"/>
-                                      </p:to>
-                                    </p:set>
-                                    <p:anim calcmode="lin" valueType="num">
-                                      <p:cBhvr additive="base">
-                                        <p:cTn id="13" dur="500" fill="hold"/>
-                                        <p:tgtEl>
-                                          <p:spTgt spid="7170">
-                                            <p:txEl>
-                                              <p:pRg st="1" end="1"/>
-                                            </p:txEl>
-                                          </p:spTgt>
-                                        </p:tgtEl>
-                                        <p:attrNameLst>
-                                          <p:attrName>ppt_x</p:attrName>
-                                        </p:attrNameLst>
-                                      </p:cBhvr>
-                                      <p:tavLst>
-                                        <p:tav tm="0">
-                                          <p:val>
-                                            <p:strVal val="#ppt_x"/>
-                                          </p:val>
-                                        </p:tav>
-                                        <p:tav tm="100000">
-                                          <p:val>
-                                            <p:strVal val="#ppt_x"/>
-                                          </p:val>
-                                        </p:tav>
-                                      </p:tavLst>
-                                    </p:anim>
-                                    <p:anim calcmode="lin" valueType="num">
-                                      <p:cBhvr additive="base">
-                                        <p:cTn id="14" dur="500" fill="hold"/>
-                                        <p:tgtEl>
-                                          <p:spTgt spid="7170">
-                                            <p:txEl>
-                                              <p:pRg st="1" end="1"/>
-                                            </p:txEl>
-                                          </p:spTgt>
-                                        </p:tgtEl>
-                                        <p:attrNameLst>
-                                          <p:attrName>ppt_y</p:attrName>
-                                        </p:attrNameLst>
-                                      </p:cBhvr>
-                                      <p:tavLst>
-                                        <p:tav tm="0">
-                                          <p:val>
-                                            <p:strVal val="1+#ppt_h/2"/>
-                                          </p:val>
-                                        </p:tav>
-                                        <p:tav tm="100000">
-                                          <p:val>
-                                            <p:strVal val="#ppt_y"/>
-                                          </p:val>
-                                        </p:tav>
-                                      </p:tavLst>
-                                    </p:anim>
-                                  </p:childTnLst>
-                                </p:cTn>
-                              </p:par>
-                            </p:childTnLst>
-                          </p:cTn>
-                        </p:par>
-                      </p:childTnLst>
-                    </p:cTn>
-                  </p:par>
-                  <p:par>
-                    <p:cTn id="15" fill="hold">
-                      <p:stCondLst>
-                        <p:cond delay="indefinite"/>
-                      </p:stCondLst>
-                      <p:childTnLst>
-                        <p:par>
-                          <p:cTn id="16" fill="hold">
-                            <p:stCondLst>
-                              <p:cond delay="0"/>
-                            </p:stCondLst>
-                            <p:childTnLst>
-                              <p:par>
-                                <p:cTn id="17" presetID="2" presetClass="entr" presetSubtype="4" fill="hold" nodeType="clickEffect">
-                                  <p:stCondLst>
-                                    <p:cond delay="0"/>
-                                  </p:stCondLst>
-                                  <p:childTnLst>
-                                    <p:set>
-                                      <p:cBhvr>
-                                        <p:cTn id="18" dur="1" fill="hold">
-                                          <p:stCondLst>
-                                            <p:cond delay="0"/>
-                                          </p:stCondLst>
-                                        </p:cTn>
-                                        <p:tgtEl>
-                                          <p:spTgt spid="7170">
-                                            <p:txEl>
-                                              <p:pRg st="2" end="2"/>
-                                            </p:txEl>
-                                          </p:spTgt>
-                                        </p:tgtEl>
-                                        <p:attrNameLst>
-                                          <p:attrName>style.visibility</p:attrName>
-                                        </p:attrNameLst>
-                                      </p:cBhvr>
-                                      <p:to>
-                                        <p:strVal val="visible"/>
-                                      </p:to>
-                                    </p:set>
-                                    <p:anim calcmode="lin" valueType="num">
-                                      <p:cBhvr additive="base">
-                                        <p:cTn id="19" dur="500" fill="hold"/>
-                                        <p:tgtEl>
-                                          <p:spTgt spid="7170">
-                                            <p:txEl>
-                                              <p:pRg st="2" end="2"/>
-                                            </p:txEl>
-                                          </p:spTgt>
-                                        </p:tgtEl>
-                                        <p:attrNameLst>
-                                          <p:attrName>ppt_x</p:attrName>
-                                        </p:attrNameLst>
-                                      </p:cBhvr>
-                                      <p:tavLst>
-                                        <p:tav tm="0">
-                                          <p:val>
-                                            <p:strVal val="#ppt_x"/>
-                                          </p:val>
-                                        </p:tav>
-                                        <p:tav tm="100000">
-                                          <p:val>
-                                            <p:strVal val="#ppt_x"/>
-                                          </p:val>
-                                        </p:tav>
-                                      </p:tavLst>
-                                    </p:anim>
-                                    <p:anim calcmode="lin" valueType="num">
-                                      <p:cBhvr additive="base">
-                                        <p:cTn id="20" dur="500" fill="hold"/>
-                                        <p:tgtEl>
-                                          <p:spTgt spid="7170">
-                                            <p:txEl>
-                                              <p:pRg st="2" end="2"/>
-                                            </p:txEl>
-                                          </p:spTgt>
-                                        </p:tgtEl>
-                                        <p:attrNameLst>
-                                          <p:attrName>ppt_y</p:attrName>
-                                        </p:attrNameLst>
-                                      </p:cBhvr>
-                                      <p:tavLst>
-                                        <p:tav tm="0">
-                                          <p:val>
-                                            <p:strVal val="1+#ppt_h/2"/>
-                                          </p:val>
-                                        </p:tav>
-                                        <p:tav tm="100000">
-                                          <p:val>
-                                            <p:strVal val="#ppt_y"/>
-                                          </p:val>
-                                        </p:tav>
-                                      </p:tavLst>
-                                    </p:anim>
-                                  </p:childTnLst>
-                                </p:cTn>
-                              </p:par>
-                            </p:childTnLst>
-                          </p:cTn>
-                        </p:par>
-                      </p:childTnLst>
-                    </p:cTn>
-                  </p:par>
-                  <p:par>
-                    <p:cTn id="21" fill="hold">
-                      <p:stCondLst>
-                        <p:cond delay="indefinite"/>
-                      </p:stCondLst>
-                      <p:childTnLst>
-                        <p:par>
-                          <p:cTn id="22" fill="hold">
-                            <p:stCondLst>
-                              <p:cond delay="0"/>
-                            </p:stCondLst>
-                            <p:childTnLst>
-                              <p:par>
-                                <p:cTn id="23" presetID="2" presetClass="entr" presetSubtype="4" fill="hold" nodeType="clickEffect">
-                                  <p:stCondLst>
-                                    <p:cond delay="0"/>
-                                  </p:stCondLst>
-                                  <p:childTnLst>
-                                    <p:set>
-                                      <p:cBhvr>
-                                        <p:cTn id="24" dur="1" fill="hold">
-                                          <p:stCondLst>
-                                            <p:cond delay="0"/>
-                                          </p:stCondLst>
-                                        </p:cTn>
-                                        <p:tgtEl>
-                                          <p:spTgt spid="7170">
-                                            <p:txEl>
-                                              <p:pRg st="7" end="7"/>
-                                            </p:txEl>
-                                          </p:spTgt>
-                                        </p:tgtEl>
-                                        <p:attrNameLst>
-                                          <p:attrName>style.visibility</p:attrName>
-                                        </p:attrNameLst>
-                                      </p:cBhvr>
-                                      <p:to>
-                                        <p:strVal val="visible"/>
-                                      </p:to>
-                                    </p:set>
-                                    <p:anim calcmode="lin" valueType="num">
-                                      <p:cBhvr additive="base">
-                                        <p:cTn id="25" dur="500" fill="hold"/>
-                                        <p:tgtEl>
-                                          <p:spTgt spid="7170">
-                                            <p:txEl>
-                                              <p:pRg st="7" end="7"/>
-                                            </p:txEl>
-                                          </p:spTgt>
-                                        </p:tgtEl>
-                                        <p:attrNameLst>
-                                          <p:attrName>ppt_x</p:attrName>
-                                        </p:attrNameLst>
-                                      </p:cBhvr>
-                                      <p:tavLst>
-                                        <p:tav tm="0">
-                                          <p:val>
-                                            <p:strVal val="#ppt_x"/>
-                                          </p:val>
-                                        </p:tav>
-                                        <p:tav tm="100000">
-                                          <p:val>
-                                            <p:strVal val="#ppt_x"/>
-                                          </p:val>
-                                        </p:tav>
-                                      </p:tavLst>
-                                    </p:anim>
-                                    <p:anim calcmode="lin" valueType="num">
-                                      <p:cBhvr additive="base">
-                                        <p:cTn id="26" dur="500" fill="hold"/>
-                                        <p:tgtEl>
-                                          <p:spTgt spid="7170">
-                                            <p:txEl>
-                                              <p:pRg st="7" end="7"/>
-                                            </p:txEl>
-                                          </p:spTgt>
-                                        </p:tgtEl>
-                                        <p:attrNameLst>
-                                          <p:attrName>ppt_y</p:attrName>
-                                        </p:attrNameLst>
-                                      </p:cBhvr>
-                                      <p:tavLst>
-                                        <p:tav tm="0">
-                                          <p:val>
-                                            <p:strVal val="1+#ppt_h/2"/>
-                                          </p:val>
-                                        </p:tav>
-                                        <p:tav tm="100000">
-                                          <p:val>
-                                            <p:strVal val="#ppt_y"/>
-                                          </p:val>
-                                        </p:tav>
-                                      </p:tavLst>
-                                    </p:anim>
-                                  </p:childTnLst>
-                                </p:cTn>
-                              </p:par>
-                            </p:childTnLst>
-                          </p:cTn>
-                        </p:par>
-                      </p:childTnLst>
-                    </p:cTn>
-                  </p:par>
-                  <p:par>
-                    <p:cTn id="27" fill="hold">
-                      <p:stCondLst>
-                        <p:cond delay="indefinite"/>
-                      </p:stCondLst>
-                      <p:childTnLst>
-                        <p:par>
-                          <p:cTn id="28" fill="hold">
-                            <p:stCondLst>
-                              <p:cond delay="0"/>
-                            </p:stCondLst>
-                            <p:childTnLst>
-                              <p:par>
-                                <p:cTn id="29" presetID="2" presetClass="entr" presetSubtype="4" fill="hold" nodeType="clickEffect">
-                                  <p:stCondLst>
-                                    <p:cond delay="0"/>
-                                  </p:stCondLst>
-                                  <p:childTnLst>
-                                    <p:set>
-                                      <p:cBhvr>
-                                        <p:cTn id="30" dur="1" fill="hold">
-                                          <p:stCondLst>
-                                            <p:cond delay="0"/>
-                                          </p:stCondLst>
-                                        </p:cTn>
-                                        <p:tgtEl>
-                                          <p:spTgt spid="7170">
-                                            <p:txEl>
-                                              <p:pRg st="10" end="10"/>
-                                            </p:txEl>
-                                          </p:spTgt>
-                                        </p:tgtEl>
-                                        <p:attrNameLst>
-                                          <p:attrName>style.visibility</p:attrName>
-                                        </p:attrNameLst>
-                                      </p:cBhvr>
-                                      <p:to>
-                                        <p:strVal val="visible"/>
-                                      </p:to>
-                                    </p:set>
-                                    <p:anim calcmode="lin" valueType="num">
-                                      <p:cBhvr additive="base">
-                                        <p:cTn id="31" dur="500" fill="hold"/>
-                                        <p:tgtEl>
-                                          <p:spTgt spid="7170">
-                                            <p:txEl>
-                                              <p:pRg st="10" end="10"/>
-                                            </p:txEl>
-                                          </p:spTgt>
-                                        </p:tgtEl>
-                                        <p:attrNameLst>
-                                          <p:attrName>ppt_x</p:attrName>
-                                        </p:attrNameLst>
-                                      </p:cBhvr>
-                                      <p:tavLst>
-                                        <p:tav tm="0">
-                                          <p:val>
-                                            <p:strVal val="#ppt_x"/>
-                                          </p:val>
-                                        </p:tav>
-                                        <p:tav tm="100000">
-                                          <p:val>
-                                            <p:strVal val="#ppt_x"/>
-                                          </p:val>
-                                        </p:tav>
-                                      </p:tavLst>
-                                    </p:anim>
-                                    <p:anim calcmode="lin" valueType="num">
-                                      <p:cBhvr additive="base">
-                                        <p:cTn id="32" dur="500" fill="hold"/>
-                                        <p:tgtEl>
-                                          <p:spTgt spid="7170">
-                                            <p:txEl>
-                                              <p:pRg st="10" end="10"/>
-                                            </p:txEl>
-                                          </p:spTgt>
-                                        </p:tgtEl>
-                                        <p:attrNameLst>
-                                          <p:attrName>ppt_y</p:attrName>
-                                        </p:attrNameLst>
-                                      </p:cBhvr>
-                                      <p:tavLst>
-                                        <p:tav tm="0">
-                                          <p:val>
-                                            <p:strVal val="1+#ppt_h/2"/>
-                                          </p:val>
-                                        </p:tav>
-                                        <p:tav tm="100000">
-                                          <p:val>
-                                            <p:strVal val="#ppt_y"/>
-                                          </p:val>
-                                        </p:tav>
-                                      </p:tavLst>
-                                    </p:anim>
-                                  </p:childTnLst>
-                                </p:cTn>
-                              </p:par>
-                            </p:childTnLst>
-                          </p:cTn>
-                        </p:par>
-                      </p:childTnLst>
-                    </p:cTn>
-                  </p:par>
-                </p:childTnLst>
-              </p:cTn>
-              <p:prevCondLst>
-                <p:cond evt="onPrev" delay="0">
-                  <p:tgtEl>
-                    <p:sldTgt/>
-                  </p:tgtEl>
-                </p:cond>
-              </p:prevCondLst>
-              <p:nextCondLst>
-                <p:cond evt="onNext" delay="0">
-                  <p:tgtEl>
-                    <p:sldTgt/>
-                  </p:tgtEl>
-                </p:cond>
-              </p:nextCondLst>
-            </p:seq>
-          </p:childTnLst>
-        </p:cTn>
+        <p:cTn id="1" dur="indefinite" restart="never" nodeType="tmRoot"/>
       </p:par>
     </p:tnLst>
   </p:timing>
@@ -17664,442 +15092,7 @@
   <p:timing>
     <p:tnLst>
       <p:par>
-        <p:cTn id="1" dur="indefinite" restart="never" nodeType="tmRoot">
-          <p:childTnLst>
-            <p:seq concurrent="1" nextAc="seek">
-              <p:cTn id="2" dur="indefinite" nodeType="mainSeq">
-                <p:childTnLst>
-                  <p:par>
-                    <p:cTn id="3" fill="hold">
-                      <p:stCondLst>
-                        <p:cond delay="indefinite"/>
-                      </p:stCondLst>
-                      <p:childTnLst>
-                        <p:par>
-                          <p:cTn id="4" fill="hold">
-                            <p:stCondLst>
-                              <p:cond delay="0"/>
-                            </p:stCondLst>
-                            <p:childTnLst>
-                              <p:par>
-                                <p:cTn id="5" presetID="2" presetClass="entr" presetSubtype="4" fill="hold" nodeType="clickEffect">
-                                  <p:stCondLst>
-                                    <p:cond delay="0"/>
-                                  </p:stCondLst>
-                                  <p:childTnLst>
-                                    <p:set>
-                                      <p:cBhvr>
-                                        <p:cTn id="6" dur="1" fill="hold">
-                                          <p:stCondLst>
-                                            <p:cond delay="0"/>
-                                          </p:stCondLst>
-                                        </p:cTn>
-                                        <p:tgtEl>
-                                          <p:spTgt spid="7170">
-                                            <p:txEl>
-                                              <p:pRg st="0" end="0"/>
-                                            </p:txEl>
-                                          </p:spTgt>
-                                        </p:tgtEl>
-                                        <p:attrNameLst>
-                                          <p:attrName>style.visibility</p:attrName>
-                                        </p:attrNameLst>
-                                      </p:cBhvr>
-                                      <p:to>
-                                        <p:strVal val="visible"/>
-                                      </p:to>
-                                    </p:set>
-                                    <p:anim calcmode="lin" valueType="num">
-                                      <p:cBhvr additive="base">
-                                        <p:cTn id="7" dur="500" fill="hold"/>
-                                        <p:tgtEl>
-                                          <p:spTgt spid="7170">
-                                            <p:txEl>
-                                              <p:pRg st="0" end="0"/>
-                                            </p:txEl>
-                                          </p:spTgt>
-                                        </p:tgtEl>
-                                        <p:attrNameLst>
-                                          <p:attrName>ppt_x</p:attrName>
-                                        </p:attrNameLst>
-                                      </p:cBhvr>
-                                      <p:tavLst>
-                                        <p:tav tm="0">
-                                          <p:val>
-                                            <p:strVal val="#ppt_x"/>
-                                          </p:val>
-                                        </p:tav>
-                                        <p:tav tm="100000">
-                                          <p:val>
-                                            <p:strVal val="#ppt_x"/>
-                                          </p:val>
-                                        </p:tav>
-                                      </p:tavLst>
-                                    </p:anim>
-                                    <p:anim calcmode="lin" valueType="num">
-                                      <p:cBhvr additive="base">
-                                        <p:cTn id="8" dur="500" fill="hold"/>
-                                        <p:tgtEl>
-                                          <p:spTgt spid="7170">
-                                            <p:txEl>
-                                              <p:pRg st="0" end="0"/>
-                                            </p:txEl>
-                                          </p:spTgt>
-                                        </p:tgtEl>
-                                        <p:attrNameLst>
-                                          <p:attrName>ppt_y</p:attrName>
-                                        </p:attrNameLst>
-                                      </p:cBhvr>
-                                      <p:tavLst>
-                                        <p:tav tm="0">
-                                          <p:val>
-                                            <p:strVal val="1+#ppt_h/2"/>
-                                          </p:val>
-                                        </p:tav>
-                                        <p:tav tm="100000">
-                                          <p:val>
-                                            <p:strVal val="#ppt_y"/>
-                                          </p:val>
-                                        </p:tav>
-                                      </p:tavLst>
-                                    </p:anim>
-                                  </p:childTnLst>
-                                </p:cTn>
-                              </p:par>
-                            </p:childTnLst>
-                          </p:cTn>
-                        </p:par>
-                      </p:childTnLst>
-                    </p:cTn>
-                  </p:par>
-                  <p:par>
-                    <p:cTn id="9" fill="hold">
-                      <p:stCondLst>
-                        <p:cond delay="indefinite"/>
-                      </p:stCondLst>
-                      <p:childTnLst>
-                        <p:par>
-                          <p:cTn id="10" fill="hold">
-                            <p:stCondLst>
-                              <p:cond delay="0"/>
-                            </p:stCondLst>
-                            <p:childTnLst>
-                              <p:par>
-                                <p:cTn id="11" presetID="2" presetClass="entr" presetSubtype="4" fill="hold" nodeType="clickEffect">
-                                  <p:stCondLst>
-                                    <p:cond delay="0"/>
-                                  </p:stCondLst>
-                                  <p:childTnLst>
-                                    <p:set>
-                                      <p:cBhvr>
-                                        <p:cTn id="12" dur="1" fill="hold">
-                                          <p:stCondLst>
-                                            <p:cond delay="0"/>
-                                          </p:stCondLst>
-                                        </p:cTn>
-                                        <p:tgtEl>
-                                          <p:spTgt spid="7170">
-                                            <p:txEl>
-                                              <p:pRg st="1" end="1"/>
-                                            </p:txEl>
-                                          </p:spTgt>
-                                        </p:tgtEl>
-                                        <p:attrNameLst>
-                                          <p:attrName>style.visibility</p:attrName>
-                                        </p:attrNameLst>
-                                      </p:cBhvr>
-                                      <p:to>
-                                        <p:strVal val="visible"/>
-                                      </p:to>
-                                    </p:set>
-                                    <p:anim calcmode="lin" valueType="num">
-                                      <p:cBhvr additive="base">
-                                        <p:cTn id="13" dur="500" fill="hold"/>
-                                        <p:tgtEl>
-                                          <p:spTgt spid="7170">
-                                            <p:txEl>
-                                              <p:pRg st="1" end="1"/>
-                                            </p:txEl>
-                                          </p:spTgt>
-                                        </p:tgtEl>
-                                        <p:attrNameLst>
-                                          <p:attrName>ppt_x</p:attrName>
-                                        </p:attrNameLst>
-                                      </p:cBhvr>
-                                      <p:tavLst>
-                                        <p:tav tm="0">
-                                          <p:val>
-                                            <p:strVal val="#ppt_x"/>
-                                          </p:val>
-                                        </p:tav>
-                                        <p:tav tm="100000">
-                                          <p:val>
-                                            <p:strVal val="#ppt_x"/>
-                                          </p:val>
-                                        </p:tav>
-                                      </p:tavLst>
-                                    </p:anim>
-                                    <p:anim calcmode="lin" valueType="num">
-                                      <p:cBhvr additive="base">
-                                        <p:cTn id="14" dur="500" fill="hold"/>
-                                        <p:tgtEl>
-                                          <p:spTgt spid="7170">
-                                            <p:txEl>
-                                              <p:pRg st="1" end="1"/>
-                                            </p:txEl>
-                                          </p:spTgt>
-                                        </p:tgtEl>
-                                        <p:attrNameLst>
-                                          <p:attrName>ppt_y</p:attrName>
-                                        </p:attrNameLst>
-                                      </p:cBhvr>
-                                      <p:tavLst>
-                                        <p:tav tm="0">
-                                          <p:val>
-                                            <p:strVal val="1+#ppt_h/2"/>
-                                          </p:val>
-                                        </p:tav>
-                                        <p:tav tm="100000">
-                                          <p:val>
-                                            <p:strVal val="#ppt_y"/>
-                                          </p:val>
-                                        </p:tav>
-                                      </p:tavLst>
-                                    </p:anim>
-                                  </p:childTnLst>
-                                </p:cTn>
-                              </p:par>
-                            </p:childTnLst>
-                          </p:cTn>
-                        </p:par>
-                      </p:childTnLst>
-                    </p:cTn>
-                  </p:par>
-                  <p:par>
-                    <p:cTn id="15" fill="hold">
-                      <p:stCondLst>
-                        <p:cond delay="indefinite"/>
-                      </p:stCondLst>
-                      <p:childTnLst>
-                        <p:par>
-                          <p:cTn id="16" fill="hold">
-                            <p:stCondLst>
-                              <p:cond delay="0"/>
-                            </p:stCondLst>
-                            <p:childTnLst>
-                              <p:par>
-                                <p:cTn id="17" presetID="2" presetClass="entr" presetSubtype="4" fill="hold" nodeType="clickEffect">
-                                  <p:stCondLst>
-                                    <p:cond delay="0"/>
-                                  </p:stCondLst>
-                                  <p:childTnLst>
-                                    <p:set>
-                                      <p:cBhvr>
-                                        <p:cTn id="18" dur="1" fill="hold">
-                                          <p:stCondLst>
-                                            <p:cond delay="0"/>
-                                          </p:stCondLst>
-                                        </p:cTn>
-                                        <p:tgtEl>
-                                          <p:spTgt spid="7170">
-                                            <p:txEl>
-                                              <p:pRg st="6" end="6"/>
-                                            </p:txEl>
-                                          </p:spTgt>
-                                        </p:tgtEl>
-                                        <p:attrNameLst>
-                                          <p:attrName>style.visibility</p:attrName>
-                                        </p:attrNameLst>
-                                      </p:cBhvr>
-                                      <p:to>
-                                        <p:strVal val="visible"/>
-                                      </p:to>
-                                    </p:set>
-                                    <p:anim calcmode="lin" valueType="num">
-                                      <p:cBhvr additive="base">
-                                        <p:cTn id="19" dur="500" fill="hold"/>
-                                        <p:tgtEl>
-                                          <p:spTgt spid="7170">
-                                            <p:txEl>
-                                              <p:pRg st="6" end="6"/>
-                                            </p:txEl>
-                                          </p:spTgt>
-                                        </p:tgtEl>
-                                        <p:attrNameLst>
-                                          <p:attrName>ppt_x</p:attrName>
-                                        </p:attrNameLst>
-                                      </p:cBhvr>
-                                      <p:tavLst>
-                                        <p:tav tm="0">
-                                          <p:val>
-                                            <p:strVal val="#ppt_x"/>
-                                          </p:val>
-                                        </p:tav>
-                                        <p:tav tm="100000">
-                                          <p:val>
-                                            <p:strVal val="#ppt_x"/>
-                                          </p:val>
-                                        </p:tav>
-                                      </p:tavLst>
-                                    </p:anim>
-                                    <p:anim calcmode="lin" valueType="num">
-                                      <p:cBhvr additive="base">
-                                        <p:cTn id="20" dur="500" fill="hold"/>
-                                        <p:tgtEl>
-                                          <p:spTgt spid="7170">
-                                            <p:txEl>
-                                              <p:pRg st="6" end="6"/>
-                                            </p:txEl>
-                                          </p:spTgt>
-                                        </p:tgtEl>
-                                        <p:attrNameLst>
-                                          <p:attrName>ppt_y</p:attrName>
-                                        </p:attrNameLst>
-                                      </p:cBhvr>
-                                      <p:tavLst>
-                                        <p:tav tm="0">
-                                          <p:val>
-                                            <p:strVal val="1+#ppt_h/2"/>
-                                          </p:val>
-                                        </p:tav>
-                                        <p:tav tm="100000">
-                                          <p:val>
-                                            <p:strVal val="#ppt_y"/>
-                                          </p:val>
-                                        </p:tav>
-                                      </p:tavLst>
-                                    </p:anim>
-                                  </p:childTnLst>
-                                </p:cTn>
-                              </p:par>
-                            </p:childTnLst>
-                          </p:cTn>
-                        </p:par>
-                      </p:childTnLst>
-                    </p:cTn>
-                  </p:par>
-                  <p:par>
-                    <p:cTn id="21" fill="hold">
-                      <p:stCondLst>
-                        <p:cond delay="indefinite"/>
-                      </p:stCondLst>
-                      <p:childTnLst>
-                        <p:par>
-                          <p:cTn id="22" fill="hold">
-                            <p:stCondLst>
-                              <p:cond delay="0"/>
-                            </p:stCondLst>
-                            <p:childTnLst>
-                              <p:par>
-                                <p:cTn id="23" presetID="2" presetClass="entr" presetSubtype="4" fill="hold" nodeType="clickEffect">
-                                  <p:stCondLst>
-                                    <p:cond delay="0"/>
-                                  </p:stCondLst>
-                                  <p:childTnLst>
-                                    <p:set>
-                                      <p:cBhvr>
-                                        <p:cTn id="24" dur="1" fill="hold">
-                                          <p:stCondLst>
-                                            <p:cond delay="0"/>
-                                          </p:stCondLst>
-                                        </p:cTn>
-                                        <p:tgtEl>
-                                          <p:spTgt spid="7170">
-                                            <p:txEl>
-                                              <p:pRg st="9" end="9"/>
-                                            </p:txEl>
-                                          </p:spTgt>
-                                        </p:tgtEl>
-                                        <p:attrNameLst>
-                                          <p:attrName>style.visibility</p:attrName>
-                                        </p:attrNameLst>
-                                      </p:cBhvr>
-                                      <p:to>
-                                        <p:strVal val="visible"/>
-                                      </p:to>
-                                    </p:set>
-                                    <p:anim calcmode="lin" valueType="num">
-                                      <p:cBhvr additive="base">
-                                        <p:cTn id="25" dur="500" fill="hold"/>
-                                        <p:tgtEl>
-                                          <p:spTgt spid="7170">
-                                            <p:txEl>
-                                              <p:pRg st="9" end="9"/>
-                                            </p:txEl>
-                                          </p:spTgt>
-                                        </p:tgtEl>
-                                        <p:attrNameLst>
-                                          <p:attrName>ppt_x</p:attrName>
-                                        </p:attrNameLst>
-                                      </p:cBhvr>
-                                      <p:tavLst>
-                                        <p:tav tm="0">
-                                          <p:val>
-                                            <p:strVal val="#ppt_x"/>
-                                          </p:val>
-                                        </p:tav>
-                                        <p:tav tm="100000">
-                                          <p:val>
-                                            <p:strVal val="#ppt_x"/>
-                                          </p:val>
-                                        </p:tav>
-                                      </p:tavLst>
-                                    </p:anim>
-                                    <p:anim calcmode="lin" valueType="num">
-                                      <p:cBhvr additive="base">
-                                        <p:cTn id="26" dur="500" fill="hold"/>
-                                        <p:tgtEl>
-                                          <p:spTgt spid="7170">
-                                            <p:txEl>
-                                              <p:pRg st="9" end="9"/>
-                                            </p:txEl>
-                                          </p:spTgt>
-                                        </p:tgtEl>
-                                        <p:attrNameLst>
-                                          <p:attrName>ppt_y</p:attrName>
-                                        </p:attrNameLst>
-                                      </p:cBhvr>
-                                      <p:tavLst>
-                                        <p:tav tm="0">
-                                          <p:val>
-                                            <p:strVal val="1+#ppt_h/2"/>
-                                          </p:val>
-                                        </p:tav>
-                                        <p:tav tm="100000">
-                                          <p:val>
-                                            <p:strVal val="#ppt_y"/>
-                                          </p:val>
-                                        </p:tav>
-                                      </p:tavLst>
-                                    </p:anim>
-                                  </p:childTnLst>
-                                </p:cTn>
-                              </p:par>
-                            </p:childTnLst>
-                          </p:cTn>
-                        </p:par>
-                      </p:childTnLst>
-                    </p:cTn>
-                  </p:par>
-                </p:childTnLst>
-              </p:cTn>
-              <p:prevCondLst>
-                <p:cond evt="onPrev" delay="0">
-                  <p:tgtEl>
-                    <p:sldTgt/>
-                  </p:tgtEl>
-                </p:cond>
-              </p:prevCondLst>
-              <p:nextCondLst>
-                <p:cond evt="onNext" delay="0">
-                  <p:tgtEl>
-                    <p:sldTgt/>
-                  </p:tgtEl>
-                </p:cond>
-              </p:nextCondLst>
-            </p:seq>
-          </p:childTnLst>
-        </p:cTn>
+        <p:cTn id="1" dur="indefinite" restart="never" nodeType="tmRoot"/>
       </p:par>
     </p:tnLst>
   </p:timing>
@@ -18860,339 +15853,7 @@
   <p:timing>
     <p:tnLst>
       <p:par>
-        <p:cTn id="1" dur="indefinite" restart="never" nodeType="tmRoot">
-          <p:childTnLst>
-            <p:seq concurrent="1" nextAc="seek">
-              <p:cTn id="2" dur="indefinite" nodeType="mainSeq">
-                <p:childTnLst>
-                  <p:par>
-                    <p:cTn id="3" fill="hold">
-                      <p:stCondLst>
-                        <p:cond delay="indefinite"/>
-                      </p:stCondLst>
-                      <p:childTnLst>
-                        <p:par>
-                          <p:cTn id="4" fill="hold">
-                            <p:stCondLst>
-                              <p:cond delay="0"/>
-                            </p:stCondLst>
-                            <p:childTnLst>
-                              <p:par>
-                                <p:cTn id="5" presetID="2" presetClass="entr" presetSubtype="4" fill="hold" nodeType="clickEffect">
-                                  <p:stCondLst>
-                                    <p:cond delay="0"/>
-                                  </p:stCondLst>
-                                  <p:childTnLst>
-                                    <p:set>
-                                      <p:cBhvr>
-                                        <p:cTn id="6" dur="1" fill="hold">
-                                          <p:stCondLst>
-                                            <p:cond delay="0"/>
-                                          </p:stCondLst>
-                                        </p:cTn>
-                                        <p:tgtEl>
-                                          <p:spTgt spid="7170">
-                                            <p:txEl>
-                                              <p:pRg st="1" end="1"/>
-                                            </p:txEl>
-                                          </p:spTgt>
-                                        </p:tgtEl>
-                                        <p:attrNameLst>
-                                          <p:attrName>style.visibility</p:attrName>
-                                        </p:attrNameLst>
-                                      </p:cBhvr>
-                                      <p:to>
-                                        <p:strVal val="visible"/>
-                                      </p:to>
-                                    </p:set>
-                                    <p:anim calcmode="lin" valueType="num">
-                                      <p:cBhvr additive="base">
-                                        <p:cTn id="7" dur="500" fill="hold"/>
-                                        <p:tgtEl>
-                                          <p:spTgt spid="7170">
-                                            <p:txEl>
-                                              <p:pRg st="1" end="1"/>
-                                            </p:txEl>
-                                          </p:spTgt>
-                                        </p:tgtEl>
-                                        <p:attrNameLst>
-                                          <p:attrName>ppt_x</p:attrName>
-                                        </p:attrNameLst>
-                                      </p:cBhvr>
-                                      <p:tavLst>
-                                        <p:tav tm="0">
-                                          <p:val>
-                                            <p:strVal val="#ppt_x"/>
-                                          </p:val>
-                                        </p:tav>
-                                        <p:tav tm="100000">
-                                          <p:val>
-                                            <p:strVal val="#ppt_x"/>
-                                          </p:val>
-                                        </p:tav>
-                                      </p:tavLst>
-                                    </p:anim>
-                                    <p:anim calcmode="lin" valueType="num">
-                                      <p:cBhvr additive="base">
-                                        <p:cTn id="8" dur="500" fill="hold"/>
-                                        <p:tgtEl>
-                                          <p:spTgt spid="7170">
-                                            <p:txEl>
-                                              <p:pRg st="1" end="1"/>
-                                            </p:txEl>
-                                          </p:spTgt>
-                                        </p:tgtEl>
-                                        <p:attrNameLst>
-                                          <p:attrName>ppt_y</p:attrName>
-                                        </p:attrNameLst>
-                                      </p:cBhvr>
-                                      <p:tavLst>
-                                        <p:tav tm="0">
-                                          <p:val>
-                                            <p:strVal val="1+#ppt_h/2"/>
-                                          </p:val>
-                                        </p:tav>
-                                        <p:tav tm="100000">
-                                          <p:val>
-                                            <p:strVal val="#ppt_y"/>
-                                          </p:val>
-                                        </p:tav>
-                                      </p:tavLst>
-                                    </p:anim>
-                                  </p:childTnLst>
-                                </p:cTn>
-                              </p:par>
-                            </p:childTnLst>
-                          </p:cTn>
-                        </p:par>
-                      </p:childTnLst>
-                    </p:cTn>
-                  </p:par>
-                  <p:par>
-                    <p:cTn id="9" fill="hold">
-                      <p:stCondLst>
-                        <p:cond delay="indefinite"/>
-                      </p:stCondLst>
-                      <p:childTnLst>
-                        <p:par>
-                          <p:cTn id="10" fill="hold">
-                            <p:stCondLst>
-                              <p:cond delay="0"/>
-                            </p:stCondLst>
-                            <p:childTnLst>
-                              <p:par>
-                                <p:cTn id="11" presetID="2" presetClass="entr" presetSubtype="4" fill="hold" nodeType="clickEffect">
-                                  <p:stCondLst>
-                                    <p:cond delay="0"/>
-                                  </p:stCondLst>
-                                  <p:childTnLst>
-                                    <p:set>
-                                      <p:cBhvr>
-                                        <p:cTn id="12" dur="1" fill="hold">
-                                          <p:stCondLst>
-                                            <p:cond delay="0"/>
-                                          </p:stCondLst>
-                                        </p:cTn>
-                                        <p:tgtEl>
-                                          <p:spTgt spid="7170">
-                                            <p:txEl>
-                                              <p:pRg st="0" end="0"/>
-                                            </p:txEl>
-                                          </p:spTgt>
-                                        </p:tgtEl>
-                                        <p:attrNameLst>
-                                          <p:attrName>style.visibility</p:attrName>
-                                        </p:attrNameLst>
-                                      </p:cBhvr>
-                                      <p:to>
-                                        <p:strVal val="visible"/>
-                                      </p:to>
-                                    </p:set>
-                                    <p:anim calcmode="lin" valueType="num">
-                                      <p:cBhvr additive="base">
-                                        <p:cTn id="13" dur="500" fill="hold"/>
-                                        <p:tgtEl>
-                                          <p:spTgt spid="7170">
-                                            <p:txEl>
-                                              <p:pRg st="0" end="0"/>
-                                            </p:txEl>
-                                          </p:spTgt>
-                                        </p:tgtEl>
-                                        <p:attrNameLst>
-                                          <p:attrName>ppt_x</p:attrName>
-                                        </p:attrNameLst>
-                                      </p:cBhvr>
-                                      <p:tavLst>
-                                        <p:tav tm="0">
-                                          <p:val>
-                                            <p:strVal val="#ppt_x"/>
-                                          </p:val>
-                                        </p:tav>
-                                        <p:tav tm="100000">
-                                          <p:val>
-                                            <p:strVal val="#ppt_x"/>
-                                          </p:val>
-                                        </p:tav>
-                                      </p:tavLst>
-                                    </p:anim>
-                                    <p:anim calcmode="lin" valueType="num">
-                                      <p:cBhvr additive="base">
-                                        <p:cTn id="14" dur="500" fill="hold"/>
-                                        <p:tgtEl>
-                                          <p:spTgt spid="7170">
-                                            <p:txEl>
-                                              <p:pRg st="0" end="0"/>
-                                            </p:txEl>
-                                          </p:spTgt>
-                                        </p:tgtEl>
-                                        <p:attrNameLst>
-                                          <p:attrName>ppt_y</p:attrName>
-                                        </p:attrNameLst>
-                                      </p:cBhvr>
-                                      <p:tavLst>
-                                        <p:tav tm="0">
-                                          <p:val>
-                                            <p:strVal val="1+#ppt_h/2"/>
-                                          </p:val>
-                                        </p:tav>
-                                        <p:tav tm="100000">
-                                          <p:val>
-                                            <p:strVal val="#ppt_y"/>
-                                          </p:val>
-                                        </p:tav>
-                                      </p:tavLst>
-                                    </p:anim>
-                                  </p:childTnLst>
-                                </p:cTn>
-                              </p:par>
-                            </p:childTnLst>
-                          </p:cTn>
-                        </p:par>
-                      </p:childTnLst>
-                    </p:cTn>
-                  </p:par>
-                  <p:par>
-                    <p:cTn id="15" fill="hold">
-                      <p:stCondLst>
-                        <p:cond delay="indefinite"/>
-                      </p:stCondLst>
-                      <p:childTnLst>
-                        <p:par>
-                          <p:cTn id="16" fill="hold">
-                            <p:stCondLst>
-                              <p:cond delay="0"/>
-                            </p:stCondLst>
-                            <p:childTnLst>
-                              <p:par>
-                                <p:cTn id="17" presetID="2" presetClass="entr" presetSubtype="4" fill="hold" nodeType="clickEffect">
-                                  <p:stCondLst>
-                                    <p:cond delay="0"/>
-                                  </p:stCondLst>
-                                  <p:childTnLst>
-                                    <p:set>
-                                      <p:cBhvr>
-                                        <p:cTn id="18" dur="1" fill="hold">
-                                          <p:stCondLst>
-                                            <p:cond delay="0"/>
-                                          </p:stCondLst>
-                                        </p:cTn>
-                                        <p:tgtEl>
-                                          <p:spTgt spid="7170">
-                                            <p:txEl>
-                                              <p:pRg st="7" end="7"/>
-                                            </p:txEl>
-                                          </p:spTgt>
-                                        </p:tgtEl>
-                                        <p:attrNameLst>
-                                          <p:attrName>style.visibility</p:attrName>
-                                        </p:attrNameLst>
-                                      </p:cBhvr>
-                                      <p:to>
-                                        <p:strVal val="visible"/>
-                                      </p:to>
-                                    </p:set>
-                                    <p:anim calcmode="lin" valueType="num">
-                                      <p:cBhvr additive="base">
-                                        <p:cTn id="19" dur="500" fill="hold"/>
-                                        <p:tgtEl>
-                                          <p:spTgt spid="7170">
-                                            <p:txEl>
-                                              <p:pRg st="7" end="7"/>
-                                            </p:txEl>
-                                          </p:spTgt>
-                                        </p:tgtEl>
-                                        <p:attrNameLst>
-                                          <p:attrName>ppt_x</p:attrName>
-                                        </p:attrNameLst>
-                                      </p:cBhvr>
-                                      <p:tavLst>
-                                        <p:tav tm="0">
-                                          <p:val>
-                                            <p:strVal val="#ppt_x"/>
-                                          </p:val>
-                                        </p:tav>
-                                        <p:tav tm="100000">
-                                          <p:val>
-                                            <p:strVal val="#ppt_x"/>
-                                          </p:val>
-                                        </p:tav>
-                                      </p:tavLst>
-                                    </p:anim>
-                                    <p:anim calcmode="lin" valueType="num">
-                                      <p:cBhvr additive="base">
-                                        <p:cTn id="20" dur="500" fill="hold"/>
-                                        <p:tgtEl>
-                                          <p:spTgt spid="7170">
-                                            <p:txEl>
-                                              <p:pRg st="7" end="7"/>
-                                            </p:txEl>
-                                          </p:spTgt>
-                                        </p:tgtEl>
-                                        <p:attrNameLst>
-                                          <p:attrName>ppt_y</p:attrName>
-                                        </p:attrNameLst>
-                                      </p:cBhvr>
-                                      <p:tavLst>
-                                        <p:tav tm="0">
-                                          <p:val>
-                                            <p:strVal val="1+#ppt_h/2"/>
-                                          </p:val>
-                                        </p:tav>
-                                        <p:tav tm="100000">
-                                          <p:val>
-                                            <p:strVal val="#ppt_y"/>
-                                          </p:val>
-                                        </p:tav>
-                                      </p:tavLst>
-                                    </p:anim>
-                                  </p:childTnLst>
-                                </p:cTn>
-                              </p:par>
-                            </p:childTnLst>
-                          </p:cTn>
-                        </p:par>
-                      </p:childTnLst>
-                    </p:cTn>
-                  </p:par>
-                </p:childTnLst>
-              </p:cTn>
-              <p:prevCondLst>
-                <p:cond evt="onPrev" delay="0">
-                  <p:tgtEl>
-                    <p:sldTgt/>
-                  </p:tgtEl>
-                </p:cond>
-              </p:prevCondLst>
-              <p:nextCondLst>
-                <p:cond evt="onNext" delay="0">
-                  <p:tgtEl>
-                    <p:sldTgt/>
-                  </p:tgtEl>
-                </p:cond>
-              </p:nextCondLst>
-            </p:seq>
-          </p:childTnLst>
-        </p:cTn>
+        <p:cTn id="1" dur="indefinite" restart="never" nodeType="tmRoot"/>
       </p:par>
     </p:tnLst>
   </p:timing>

</xml_diff>